<commit_message>
Adhafera list categories (#107)
* update gui

* add image

* update images

* update image

* update external spec

* update sequence uml

* update class uml

* remove sequence for settle

* update internal spec
</commit_message>
<xml_diff>
--- a/bin/adhafera.pptx
+++ b/bin/adhafera.pptx
@@ -5,13 +5,14 @@
     <p:sldMasterId id="2147483648" r:id="rId1"/>
   </p:sldMasterIdLst>
   <p:notesMasterIdLst>
-    <p:notesMasterId r:id="rId6"/>
+    <p:notesMasterId r:id="rId7"/>
   </p:notesMasterIdLst>
   <p:sldIdLst>
     <p:sldId id="256" r:id="rId2"/>
-    <p:sldId id="263" r:id="rId3"/>
-    <p:sldId id="265" r:id="rId4"/>
-    <p:sldId id="264" r:id="rId5"/>
+    <p:sldId id="267" r:id="rId3"/>
+    <p:sldId id="266" r:id="rId4"/>
+    <p:sldId id="265" r:id="rId5"/>
+    <p:sldId id="264" r:id="rId6"/>
   </p:sldIdLst>
   <p:sldSz cx="9144000" cy="6858000" type="screen4x3"/>
   <p:notesSz cx="6858000" cy="9144000"/>
@@ -195,7 +196,7 @@
           <a:p>
             <a:fld id="{EE82FEE5-269B-9B49-A8C4-823C45BE6055}" type="datetimeFigureOut">
               <a:rPr kumimoji="1" lang="ja-JP" altLang="en-US" smtClean="0"/>
-              <a:t>16/08/06</a:t>
+              <a:t>17/05/01</a:t>
             </a:fld>
             <a:endParaRPr kumimoji="1" lang="ja-JP" altLang="en-US"/>
           </a:p>
@@ -747,6 +748,90 @@
 </p:notes>
 </file>
 
+<file path=ppt/notesSlides/notesSlide4.xml><?xml version="1.0" encoding="utf-8"?>
+<p:notes xmlns:a="http://schemas.openxmlformats.org/drawingml/2006/main" xmlns:r="http://schemas.openxmlformats.org/officeDocument/2006/relationships" xmlns:p="http://schemas.openxmlformats.org/presentationml/2006/main">
+  <p:cSld>
+    <p:spTree>
+      <p:nvGrpSpPr>
+        <p:cNvPr id="1" name=""/>
+        <p:cNvGrpSpPr/>
+        <p:nvPr/>
+      </p:nvGrpSpPr>
+      <p:grpSpPr>
+        <a:xfrm>
+          <a:off x="0" y="0"/>
+          <a:ext cx="0" cy="0"/>
+          <a:chOff x="0" y="0"/>
+          <a:chExt cx="0" cy="0"/>
+        </a:xfrm>
+      </p:grpSpPr>
+      <p:sp>
+        <p:nvSpPr>
+          <p:cNvPr id="2" name="スライド イメージ プレースホルダー 1"/>
+          <p:cNvSpPr>
+            <a:spLocks noGrp="1" noRot="1" noChangeAspect="1"/>
+          </p:cNvSpPr>
+          <p:nvPr>
+            <p:ph type="sldImg"/>
+          </p:nvPr>
+        </p:nvSpPr>
+        <p:spPr/>
+      </p:sp>
+      <p:sp>
+        <p:nvSpPr>
+          <p:cNvPr id="3" name="ノート プレースホルダー 2"/>
+          <p:cNvSpPr>
+            <a:spLocks noGrp="1"/>
+          </p:cNvSpPr>
+          <p:nvPr>
+            <p:ph type="body" idx="1"/>
+          </p:nvPr>
+        </p:nvSpPr>
+        <p:spPr/>
+        <p:txBody>
+          <a:bodyPr/>
+          <a:lstStyle/>
+          <a:p>
+            <a:endParaRPr kumimoji="1" lang="ja-JP" altLang="en-US" dirty="0"/>
+          </a:p>
+        </p:txBody>
+      </p:sp>
+      <p:sp>
+        <p:nvSpPr>
+          <p:cNvPr id="4" name="スライド番号プレースホルダー 3"/>
+          <p:cNvSpPr>
+            <a:spLocks noGrp="1"/>
+          </p:cNvSpPr>
+          <p:nvPr>
+            <p:ph type="sldNum" sz="quarter" idx="10"/>
+          </p:nvPr>
+        </p:nvSpPr>
+        <p:spPr/>
+        <p:txBody>
+          <a:bodyPr/>
+          <a:lstStyle/>
+          <a:p>
+            <a:fld id="{A9E1B25B-30E5-7A42-A56A-DF1A6F86BC06}" type="slidenum">
+              <a:rPr kumimoji="1" lang="ja-JP" altLang="en-US" smtClean="0"/>
+              <a:t>5</a:t>
+            </a:fld>
+            <a:endParaRPr kumimoji="1" lang="ja-JP" altLang="en-US"/>
+          </a:p>
+        </p:txBody>
+      </p:sp>
+    </p:spTree>
+    <p:extLst>
+      <p:ext uri="{BB962C8B-B14F-4D97-AF65-F5344CB8AC3E}">
+        <p14:creationId xmlns:p14="http://schemas.microsoft.com/office/powerpoint/2010/main" val="3631066132"/>
+      </p:ext>
+    </p:extLst>
+  </p:cSld>
+  <p:clrMapOvr>
+    <a:masterClrMapping/>
+  </p:clrMapOvr>
+</p:notes>
+</file>
+
 <file path=ppt/slideLayouts/slideLayout1.xml><?xml version="1.0" encoding="utf-8"?>
 <p:sldLayout xmlns:a="http://schemas.openxmlformats.org/drawingml/2006/main" xmlns:r="http://schemas.openxmlformats.org/officeDocument/2006/relationships" xmlns:p="http://schemas.openxmlformats.org/presentationml/2006/main" type="title" preserve="1">
   <p:cSld name="タイトル スライド">
@@ -928,7 +1013,7 @@
           <a:p>
             <a:fld id="{3ABA01A1-4899-9944-833D-6A66CDE659CB}" type="datetimeFigureOut">
               <a:rPr kumimoji="1" lang="ja-JP" altLang="en-US" smtClean="0"/>
-              <a:t>16/08/06</a:t>
+              <a:t>17/05/01</a:t>
             </a:fld>
             <a:endParaRPr kumimoji="1" lang="ja-JP" altLang="en-US"/>
           </a:p>
@@ -1130,7 +1215,7 @@
           <a:p>
             <a:fld id="{3ABA01A1-4899-9944-833D-6A66CDE659CB}" type="datetimeFigureOut">
               <a:rPr kumimoji="1" lang="ja-JP" altLang="en-US" smtClean="0"/>
-              <a:t>16/08/06</a:t>
+              <a:t>17/05/01</a:t>
             </a:fld>
             <a:endParaRPr kumimoji="1" lang="ja-JP" altLang="en-US"/>
           </a:p>
@@ -1342,7 +1427,7 @@
           <a:p>
             <a:fld id="{3ABA01A1-4899-9944-833D-6A66CDE659CB}" type="datetimeFigureOut">
               <a:rPr kumimoji="1" lang="ja-JP" altLang="en-US" smtClean="0"/>
-              <a:t>16/08/06</a:t>
+              <a:t>17/05/01</a:t>
             </a:fld>
             <a:endParaRPr kumimoji="1" lang="ja-JP" altLang="en-US"/>
           </a:p>
@@ -1544,7 +1629,7 @@
           <a:p>
             <a:fld id="{3ABA01A1-4899-9944-833D-6A66CDE659CB}" type="datetimeFigureOut">
               <a:rPr kumimoji="1" lang="ja-JP" altLang="en-US" smtClean="0"/>
-              <a:t>16/08/06</a:t>
+              <a:t>17/05/01</a:t>
             </a:fld>
             <a:endParaRPr kumimoji="1" lang="ja-JP" altLang="en-US"/>
           </a:p>
@@ -1790,7 +1875,7 @@
           <a:p>
             <a:fld id="{3ABA01A1-4899-9944-833D-6A66CDE659CB}" type="datetimeFigureOut">
               <a:rPr kumimoji="1" lang="ja-JP" altLang="en-US" smtClean="0"/>
-              <a:t>16/08/06</a:t>
+              <a:t>17/05/01</a:t>
             </a:fld>
             <a:endParaRPr kumimoji="1" lang="ja-JP" altLang="en-US"/>
           </a:p>
@@ -2142,7 +2227,7 @@
           <a:p>
             <a:fld id="{3ABA01A1-4899-9944-833D-6A66CDE659CB}" type="datetimeFigureOut">
               <a:rPr kumimoji="1" lang="ja-JP" altLang="en-US" smtClean="0"/>
-              <a:t>16/08/06</a:t>
+              <a:t>17/05/01</a:t>
             </a:fld>
             <a:endParaRPr kumimoji="1" lang="ja-JP" altLang="en-US"/>
           </a:p>
@@ -2628,7 +2713,7 @@
           <a:p>
             <a:fld id="{3ABA01A1-4899-9944-833D-6A66CDE659CB}" type="datetimeFigureOut">
               <a:rPr kumimoji="1" lang="ja-JP" altLang="en-US" smtClean="0"/>
-              <a:t>16/08/06</a:t>
+              <a:t>17/05/01</a:t>
             </a:fld>
             <a:endParaRPr kumimoji="1" lang="ja-JP" altLang="en-US"/>
           </a:p>
@@ -2746,7 +2831,7 @@
           <a:p>
             <a:fld id="{3ABA01A1-4899-9944-833D-6A66CDE659CB}" type="datetimeFigureOut">
               <a:rPr kumimoji="1" lang="ja-JP" altLang="en-US" smtClean="0"/>
-              <a:t>16/08/06</a:t>
+              <a:t>17/05/01</a:t>
             </a:fld>
             <a:endParaRPr kumimoji="1" lang="ja-JP" altLang="en-US"/>
           </a:p>
@@ -2841,7 +2926,7 @@
           <a:p>
             <a:fld id="{3ABA01A1-4899-9944-833D-6A66CDE659CB}" type="datetimeFigureOut">
               <a:rPr kumimoji="1" lang="ja-JP" altLang="en-US" smtClean="0"/>
-              <a:t>16/08/06</a:t>
+              <a:t>17/05/01</a:t>
             </a:fld>
             <a:endParaRPr kumimoji="1" lang="ja-JP" altLang="en-US"/>
           </a:p>
@@ -3150,7 +3235,7 @@
           <a:p>
             <a:fld id="{3ABA01A1-4899-9944-833D-6A66CDE659CB}" type="datetimeFigureOut">
               <a:rPr kumimoji="1" lang="ja-JP" altLang="en-US" smtClean="0"/>
-              <a:t>16/08/06</a:t>
+              <a:t>17/05/01</a:t>
             </a:fld>
             <a:endParaRPr kumimoji="1" lang="ja-JP" altLang="en-US"/>
           </a:p>
@@ -3403,7 +3488,7 @@
           <a:p>
             <a:fld id="{3ABA01A1-4899-9944-833D-6A66CDE659CB}" type="datetimeFigureOut">
               <a:rPr kumimoji="1" lang="ja-JP" altLang="en-US" smtClean="0"/>
-              <a:t>16/08/06</a:t>
+              <a:t>17/05/01</a:t>
             </a:fld>
             <a:endParaRPr kumimoji="1" lang="ja-JP" altLang="en-US"/>
           </a:p>
@@ -3648,7 +3733,7 @@
           <a:p>
             <a:fld id="{3ABA01A1-4899-9944-833D-6A66CDE659CB}" type="datetimeFigureOut">
               <a:rPr kumimoji="1" lang="ja-JP" altLang="en-US" smtClean="0"/>
-              <a:t>16/08/06</a:t>
+              <a:t>17/05/01</a:t>
             </a:fld>
             <a:endParaRPr kumimoji="1" lang="ja-JP" altLang="en-US"/>
           </a:p>
@@ -4084,7 +4169,11 @@
             </a:r>
             <a:r>
               <a:rPr lang="en-US" altLang="ja-JP" sz="2800" dirty="0" smtClean="0"/>
-              <a:t>2016/08/06</a:t>
+              <a:t>2017/05/01</a:t>
+            </a:r>
+            <a:r>
+              <a:rPr lang="en-US" altLang="ja-JP" sz="2800" dirty="0" smtClean="0"/>
+              <a:t/>
             </a:r>
             <a:br>
               <a:rPr lang="en-US" altLang="ja-JP" sz="2800" dirty="0" smtClean="0"/>
@@ -4095,7 +4184,11 @@
             </a:r>
             <a:r>
               <a:rPr lang="en-US" altLang="ja-JP" sz="2800" dirty="0" smtClean="0"/>
-              <a:t> 2.0.0</a:t>
+              <a:t> </a:t>
+            </a:r>
+            <a:r>
+              <a:rPr lang="en-US" altLang="ja-JP" sz="2800" dirty="0" smtClean="0"/>
+              <a:t>2.1.0</a:t>
             </a:r>
             <a:endParaRPr kumimoji="1" lang="ja-JP" altLang="en-US" dirty="0"/>
           </a:p>
@@ -4760,7 +4853,7 @@
               <a:avLst/>
             </a:prstGeom>
             <a:solidFill>
-              <a:schemeClr val="tx1"/>
+              <a:schemeClr val="bg1"/>
             </a:solidFill>
             <a:ln>
               <a:solidFill>
@@ -5090,31 +5183,270 @@
           </p:txBody>
         </p:sp>
       </p:grpSp>
+      <p:grpSp>
+        <p:nvGrpSpPr>
+          <p:cNvPr id="8" name="図形グループ 7"/>
+          <p:cNvGrpSpPr/>
+          <p:nvPr/>
+        </p:nvGrpSpPr>
+        <p:grpSpPr>
+          <a:xfrm>
+            <a:off x="5133990" y="4623225"/>
+            <a:ext cx="2409517" cy="872852"/>
+            <a:chOff x="5133990" y="4623225"/>
+            <a:chExt cx="2409517" cy="872852"/>
+          </a:xfrm>
+        </p:grpSpPr>
+        <p:sp>
+          <p:nvSpPr>
+            <p:cNvPr id="32" name="円形吹き出し 31"/>
+            <p:cNvSpPr/>
+            <p:nvPr/>
+          </p:nvSpPr>
+          <p:spPr>
+            <a:xfrm>
+              <a:off x="5133990" y="4623225"/>
+              <a:ext cx="2409517" cy="872852"/>
+            </a:xfrm>
+            <a:prstGeom prst="wedgeEllipseCallout">
+              <a:avLst>
+                <a:gd name="adj1" fmla="val -47434"/>
+                <a:gd name="adj2" fmla="val -62691"/>
+              </a:avLst>
+            </a:prstGeom>
+            <a:solidFill>
+              <a:schemeClr val="bg1"/>
+            </a:solidFill>
+            <a:ln w="19050">
+              <a:solidFill>
+                <a:srgbClr val="008000"/>
+              </a:solidFill>
+            </a:ln>
+          </p:spPr>
+          <p:style>
+            <a:lnRef idx="1">
+              <a:schemeClr val="accent1"/>
+            </a:lnRef>
+            <a:fillRef idx="3">
+              <a:schemeClr val="accent1"/>
+            </a:fillRef>
+            <a:effectRef idx="2">
+              <a:schemeClr val="accent1"/>
+            </a:effectRef>
+            <a:fontRef idx="minor">
+              <a:schemeClr val="lt1"/>
+            </a:fontRef>
+          </p:style>
+          <p:txBody>
+            <a:bodyPr rtlCol="0" anchor="ctr"/>
+            <a:lstStyle/>
+            <a:p>
+              <a:pPr algn="ctr"/>
+              <a:endParaRPr kumimoji="1" lang="ja-JP" altLang="en-US" sz="1400" dirty="0">
+                <a:solidFill>
+                  <a:schemeClr val="tx1"/>
+                </a:solidFill>
+                <a:latin typeface="メイリオ"/>
+                <a:ea typeface="メイリオ"/>
+                <a:cs typeface="メイリオ"/>
+              </a:endParaRPr>
+            </a:p>
+          </p:txBody>
+        </p:sp>
+        <p:sp>
+          <p:nvSpPr>
+            <p:cNvPr id="33" name="テキスト ボックス 32"/>
+            <p:cNvSpPr txBox="1"/>
+            <p:nvPr/>
+          </p:nvSpPr>
+          <p:spPr>
+            <a:xfrm>
+              <a:off x="5285980" y="4807152"/>
+              <a:ext cx="2159566" cy="523220"/>
+            </a:xfrm>
+            <a:prstGeom prst="rect">
+              <a:avLst/>
+            </a:prstGeom>
+            <a:noFill/>
+          </p:spPr>
+          <p:txBody>
+            <a:bodyPr wrap="none" rtlCol="0">
+              <a:spAutoFit/>
+            </a:bodyPr>
+            <a:lstStyle/>
+            <a:p>
+              <a:r>
+                <a:rPr lang="en-US" altLang="en-US" sz="1400" dirty="0" smtClean="0">
+                  <a:latin typeface="メイリオ"/>
+                  <a:ea typeface="メイリオ"/>
+                  <a:cs typeface="メイリオ"/>
+                </a:rPr>
+                <a:t>アプリ起動時の月の収支</a:t>
+              </a:r>
+            </a:p>
+            <a:p>
+              <a:r>
+                <a:rPr lang="en-US" altLang="en-US" sz="1400" dirty="0" smtClean="0">
+                  <a:latin typeface="メイリオ"/>
+                  <a:ea typeface="メイリオ"/>
+                  <a:cs typeface="メイリオ"/>
+                </a:rPr>
+                <a:t>が表示される</a:t>
+              </a:r>
+            </a:p>
+          </p:txBody>
+        </p:sp>
+      </p:grpSp>
+      <p:grpSp>
+        <p:nvGrpSpPr>
+          <p:cNvPr id="2" name="図形グループ 1"/>
+          <p:cNvGrpSpPr/>
+          <p:nvPr/>
+        </p:nvGrpSpPr>
+        <p:grpSpPr>
+          <a:xfrm>
+            <a:off x="5951388" y="1272749"/>
+            <a:ext cx="2409517" cy="872852"/>
+            <a:chOff x="5443408" y="1665279"/>
+            <a:chExt cx="2409517" cy="872852"/>
+          </a:xfrm>
+        </p:grpSpPr>
+        <p:sp>
+          <p:nvSpPr>
+            <p:cNvPr id="28" name="円形吹き出し 27"/>
+            <p:cNvSpPr/>
+            <p:nvPr/>
+          </p:nvSpPr>
+          <p:spPr>
+            <a:xfrm>
+              <a:off x="5443408" y="1665279"/>
+              <a:ext cx="2409517" cy="872852"/>
+            </a:xfrm>
+            <a:prstGeom prst="wedgeEllipseCallout">
+              <a:avLst>
+                <a:gd name="adj1" fmla="val -68517"/>
+                <a:gd name="adj2" fmla="val -29623"/>
+              </a:avLst>
+            </a:prstGeom>
+            <a:solidFill>
+              <a:schemeClr val="bg1"/>
+            </a:solidFill>
+            <a:ln w="19050">
+              <a:solidFill>
+                <a:srgbClr val="008000"/>
+              </a:solidFill>
+            </a:ln>
+          </p:spPr>
+          <p:style>
+            <a:lnRef idx="1">
+              <a:schemeClr val="accent1"/>
+            </a:lnRef>
+            <a:fillRef idx="3">
+              <a:schemeClr val="accent1"/>
+            </a:fillRef>
+            <a:effectRef idx="2">
+              <a:schemeClr val="accent1"/>
+            </a:effectRef>
+            <a:fontRef idx="minor">
+              <a:schemeClr val="lt1"/>
+            </a:fontRef>
+          </p:style>
+          <p:txBody>
+            <a:bodyPr rtlCol="0" anchor="ctr"/>
+            <a:lstStyle/>
+            <a:p>
+              <a:pPr algn="ctr"/>
+              <a:endParaRPr kumimoji="1" lang="ja-JP" altLang="en-US" sz="1400" dirty="0">
+                <a:solidFill>
+                  <a:schemeClr val="tx1"/>
+                </a:solidFill>
+                <a:latin typeface="メイリオ"/>
+                <a:ea typeface="メイリオ"/>
+                <a:cs typeface="メイリオ"/>
+              </a:endParaRPr>
+            </a:p>
+          </p:txBody>
+        </p:sp>
+        <p:sp>
+          <p:nvSpPr>
+            <p:cNvPr id="29" name="テキスト ボックス 28"/>
+            <p:cNvSpPr txBox="1"/>
+            <p:nvPr/>
+          </p:nvSpPr>
+          <p:spPr>
+            <a:xfrm>
+              <a:off x="5648428" y="1837660"/>
+              <a:ext cx="1980029" cy="523220"/>
+            </a:xfrm>
+            <a:prstGeom prst="rect">
+              <a:avLst/>
+            </a:prstGeom>
+            <a:noFill/>
+          </p:spPr>
+          <p:txBody>
+            <a:bodyPr wrap="none" rtlCol="0">
+              <a:spAutoFit/>
+            </a:bodyPr>
+            <a:lstStyle/>
+            <a:p>
+              <a:r>
+                <a:rPr lang="ja-JP" altLang="en-US" sz="1400" dirty="0" smtClean="0">
+                  <a:latin typeface="メイリオ"/>
+                  <a:ea typeface="メイリオ"/>
+                  <a:cs typeface="メイリオ"/>
+                </a:rPr>
+                <a:t>アプリ起動時の</a:t>
+              </a:r>
+              <a:r>
+                <a:rPr lang="en-US" altLang="en-US" sz="1400" dirty="0" smtClean="0">
+                  <a:latin typeface="メイリオ"/>
+                  <a:ea typeface="メイリオ"/>
+                  <a:cs typeface="メイリオ"/>
+                </a:rPr>
+                <a:t>日付が</a:t>
+              </a:r>
+            </a:p>
+            <a:p>
+              <a:r>
+                <a:rPr lang="ja-JP" altLang="en-US" sz="1400" dirty="0" smtClean="0">
+                  <a:latin typeface="メイリオ"/>
+                  <a:ea typeface="メイリオ"/>
+                  <a:cs typeface="メイリオ"/>
+                </a:rPr>
+                <a:t>入力されている</a:t>
+              </a:r>
+              <a:endParaRPr lang="en-US" altLang="ja-JP" sz="1400" dirty="0" smtClean="0">
+                <a:latin typeface="メイリオ"/>
+                <a:ea typeface="メイリオ"/>
+                <a:cs typeface="メイリオ"/>
+              </a:endParaRPr>
+            </a:p>
+          </p:txBody>
+        </p:sp>
+      </p:grpSp>
       <p:sp>
         <p:nvSpPr>
-          <p:cNvPr id="32" name="円形吹き出し 31"/>
+          <p:cNvPr id="7" name="二等辺三角形 6"/>
           <p:cNvSpPr/>
           <p:nvPr/>
         </p:nvSpPr>
         <p:spPr>
-          <a:xfrm>
-            <a:off x="5133990" y="4623225"/>
-            <a:ext cx="2409517" cy="872852"/>
+          <a:xfrm rot="10800000">
+            <a:off x="5590680" y="2436092"/>
+            <a:ext cx="182047" cy="156059"/>
           </a:xfrm>
-          <a:prstGeom prst="wedgeEllipseCallout">
-            <a:avLst>
-              <a:gd name="adj1" fmla="val -47434"/>
-              <a:gd name="adj2" fmla="val -62691"/>
-            </a:avLst>
+          <a:prstGeom prst="triangle">
+            <a:avLst/>
           </a:prstGeom>
           <a:solidFill>
-            <a:schemeClr val="bg1"/>
+            <a:schemeClr val="tx1"/>
           </a:solidFill>
-          <a:ln w="19050">
+          <a:ln>
             <a:solidFill>
-              <a:srgbClr val="008000"/>
+              <a:schemeClr val="tx1"/>
             </a:solidFill>
           </a:ln>
+          <a:effectLst/>
         </p:spPr>
         <p:style>
           <a:lnRef idx="1">
@@ -5135,27 +5467,311 @@
           <a:lstStyle/>
           <a:p>
             <a:pPr algn="ctr"/>
-            <a:endParaRPr kumimoji="1" lang="ja-JP" altLang="en-US" sz="1400" dirty="0">
-              <a:solidFill>
-                <a:schemeClr val="tx1"/>
-              </a:solidFill>
-              <a:latin typeface="メイリオ"/>
-              <a:ea typeface="メイリオ"/>
-              <a:cs typeface="メイリオ"/>
-            </a:endParaRPr>
+            <a:endParaRPr kumimoji="1" lang="ja-JP" altLang="en-US"/>
           </a:p>
         </p:txBody>
       </p:sp>
+      <p:grpSp>
+        <p:nvGrpSpPr>
+          <p:cNvPr id="34" name="図形グループ 33"/>
+          <p:cNvGrpSpPr/>
+          <p:nvPr/>
+        </p:nvGrpSpPr>
+        <p:grpSpPr>
+          <a:xfrm>
+            <a:off x="5772727" y="2934356"/>
+            <a:ext cx="2409517" cy="1065921"/>
+            <a:chOff x="5443408" y="1665278"/>
+            <a:chExt cx="2409517" cy="1065921"/>
+          </a:xfrm>
+        </p:grpSpPr>
+        <p:sp>
+          <p:nvSpPr>
+            <p:cNvPr id="35" name="円形吹き出し 34"/>
+            <p:cNvSpPr/>
+            <p:nvPr/>
+          </p:nvSpPr>
+          <p:spPr>
+            <a:xfrm>
+              <a:off x="5443408" y="1665278"/>
+              <a:ext cx="2409517" cy="1065921"/>
+            </a:xfrm>
+            <a:prstGeom prst="wedgeEllipseCallout">
+              <a:avLst>
+                <a:gd name="adj1" fmla="val -46476"/>
+                <a:gd name="adj2" fmla="val -71950"/>
+              </a:avLst>
+            </a:prstGeom>
+            <a:solidFill>
+              <a:schemeClr val="bg1"/>
+            </a:solidFill>
+            <a:ln w="19050">
+              <a:solidFill>
+                <a:srgbClr val="008000"/>
+              </a:solidFill>
+            </a:ln>
+          </p:spPr>
+          <p:style>
+            <a:lnRef idx="1">
+              <a:schemeClr val="accent1"/>
+            </a:lnRef>
+            <a:fillRef idx="3">
+              <a:schemeClr val="accent1"/>
+            </a:fillRef>
+            <a:effectRef idx="2">
+              <a:schemeClr val="accent1"/>
+            </a:effectRef>
+            <a:fontRef idx="minor">
+              <a:schemeClr val="lt1"/>
+            </a:fontRef>
+          </p:style>
+          <p:txBody>
+            <a:bodyPr rtlCol="0" anchor="ctr"/>
+            <a:lstStyle/>
+            <a:p>
+              <a:pPr algn="ctr"/>
+              <a:endParaRPr kumimoji="1" lang="ja-JP" altLang="en-US" sz="1400" dirty="0">
+                <a:solidFill>
+                  <a:schemeClr val="tx1"/>
+                </a:solidFill>
+                <a:latin typeface="メイリオ"/>
+                <a:ea typeface="メイリオ"/>
+                <a:cs typeface="メイリオ"/>
+              </a:endParaRPr>
+            </a:p>
+          </p:txBody>
+        </p:sp>
+        <p:sp>
+          <p:nvSpPr>
+            <p:cNvPr id="36" name="テキスト ボックス 35"/>
+            <p:cNvSpPr txBox="1"/>
+            <p:nvPr/>
+          </p:nvSpPr>
+          <p:spPr>
+            <a:xfrm>
+              <a:off x="5648428" y="1837660"/>
+              <a:ext cx="2044149" cy="738664"/>
+            </a:xfrm>
+            <a:prstGeom prst="rect">
+              <a:avLst/>
+            </a:prstGeom>
+            <a:noFill/>
+          </p:spPr>
+          <p:txBody>
+            <a:bodyPr wrap="none" rtlCol="0">
+              <a:spAutoFit/>
+            </a:bodyPr>
+            <a:lstStyle/>
+            <a:p>
+              <a:r>
+                <a:rPr lang="en-US" altLang="en-US" sz="1400" dirty="0" smtClean="0">
+                  <a:latin typeface="メイリオ"/>
+                  <a:ea typeface="メイリオ"/>
+                  <a:cs typeface="メイリオ"/>
+                </a:rPr>
+                <a:t>カテゴリ選択ボタンが</a:t>
+              </a:r>
+            </a:p>
+            <a:p>
+              <a:r>
+                <a:rPr lang="en-US" altLang="en-US" sz="1400" dirty="0" smtClean="0">
+                  <a:latin typeface="メイリオ"/>
+                  <a:ea typeface="メイリオ"/>
+                  <a:cs typeface="メイリオ"/>
+                </a:rPr>
+                <a:t>表示されている</a:t>
+              </a:r>
+              <a:endParaRPr lang="en-US" altLang="en-US" sz="1400" dirty="0">
+                <a:latin typeface="メイリオ"/>
+                <a:ea typeface="メイリオ"/>
+                <a:cs typeface="メイリオ"/>
+              </a:endParaRPr>
+            </a:p>
+            <a:p>
+              <a:r>
+                <a:rPr lang="en-US" altLang="ja-JP" sz="1400" dirty="0" smtClean="0">
+                  <a:latin typeface="メイリオ"/>
+                  <a:ea typeface="メイリオ"/>
+                  <a:cs typeface="メイリオ"/>
+                </a:rPr>
+                <a:t>→ </a:t>
+              </a:r>
+              <a:r>
+                <a:rPr lang="ja-JP" altLang="en-US" sz="1400" dirty="0" smtClean="0">
+                  <a:latin typeface="メイリオ"/>
+                  <a:ea typeface="メイリオ"/>
+                  <a:cs typeface="メイリオ"/>
+                </a:rPr>
+                <a:t>カテゴリ選択画面へ</a:t>
+              </a:r>
+              <a:endParaRPr lang="en-US" altLang="en-US" sz="1400" dirty="0" smtClean="0">
+                <a:latin typeface="メイリオ"/>
+                <a:ea typeface="メイリオ"/>
+                <a:cs typeface="メイリオ"/>
+              </a:endParaRPr>
+            </a:p>
+          </p:txBody>
+        </p:sp>
+      </p:grpSp>
+      <p:grpSp>
+        <p:nvGrpSpPr>
+          <p:cNvPr id="37" name="図形グループ 36"/>
+          <p:cNvGrpSpPr/>
+          <p:nvPr/>
+        </p:nvGrpSpPr>
+        <p:grpSpPr>
+          <a:xfrm>
+            <a:off x="1073727" y="3293131"/>
+            <a:ext cx="2119453" cy="872852"/>
+            <a:chOff x="5424054" y="4623225"/>
+            <a:chExt cx="2119453" cy="872852"/>
+          </a:xfrm>
+        </p:grpSpPr>
+        <p:sp>
+          <p:nvSpPr>
+            <p:cNvPr id="38" name="円形吹き出し 37"/>
+            <p:cNvSpPr/>
+            <p:nvPr/>
+          </p:nvSpPr>
+          <p:spPr>
+            <a:xfrm>
+              <a:off x="5424054" y="4623225"/>
+              <a:ext cx="2119453" cy="872852"/>
+            </a:xfrm>
+            <a:prstGeom prst="wedgeEllipseCallout">
+              <a:avLst>
+                <a:gd name="adj1" fmla="val 62773"/>
+                <a:gd name="adj2" fmla="val -16396"/>
+              </a:avLst>
+            </a:prstGeom>
+            <a:solidFill>
+              <a:schemeClr val="bg1"/>
+            </a:solidFill>
+            <a:ln w="19050">
+              <a:solidFill>
+                <a:srgbClr val="008000"/>
+              </a:solidFill>
+            </a:ln>
+          </p:spPr>
+          <p:style>
+            <a:lnRef idx="1">
+              <a:schemeClr val="accent1"/>
+            </a:lnRef>
+            <a:fillRef idx="3">
+              <a:schemeClr val="accent1"/>
+            </a:fillRef>
+            <a:effectRef idx="2">
+              <a:schemeClr val="accent1"/>
+            </a:effectRef>
+            <a:fontRef idx="minor">
+              <a:schemeClr val="lt1"/>
+            </a:fontRef>
+          </p:style>
+          <p:txBody>
+            <a:bodyPr rtlCol="0" anchor="ctr"/>
+            <a:lstStyle/>
+            <a:p>
+              <a:pPr algn="ctr"/>
+              <a:endParaRPr kumimoji="1" lang="ja-JP" altLang="en-US" sz="1400" dirty="0">
+                <a:solidFill>
+                  <a:schemeClr val="tx1"/>
+                </a:solidFill>
+                <a:latin typeface="メイリオ"/>
+                <a:ea typeface="メイリオ"/>
+                <a:cs typeface="メイリオ"/>
+              </a:endParaRPr>
+            </a:p>
+          </p:txBody>
+        </p:sp>
+        <p:sp>
+          <p:nvSpPr>
+            <p:cNvPr id="39" name="テキスト ボックス 38"/>
+            <p:cNvSpPr txBox="1"/>
+            <p:nvPr/>
+          </p:nvSpPr>
+          <p:spPr>
+            <a:xfrm>
+              <a:off x="5586150" y="4807152"/>
+              <a:ext cx="1800493" cy="523220"/>
+            </a:xfrm>
+            <a:prstGeom prst="rect">
+              <a:avLst/>
+            </a:prstGeom>
+            <a:noFill/>
+          </p:spPr>
+          <p:txBody>
+            <a:bodyPr wrap="none" rtlCol="0">
+              <a:spAutoFit/>
+            </a:bodyPr>
+            <a:lstStyle/>
+            <a:p>
+              <a:r>
+                <a:rPr lang="en-US" altLang="en-US" sz="1400" dirty="0" smtClean="0">
+                  <a:latin typeface="メイリオ"/>
+                  <a:ea typeface="メイリオ"/>
+                  <a:cs typeface="メイリオ"/>
+                </a:rPr>
+                <a:t>デフォルトは支出が</a:t>
+              </a:r>
+            </a:p>
+            <a:p>
+              <a:r>
+                <a:rPr lang="en-US" altLang="en-US" sz="1400" dirty="0" smtClean="0">
+                  <a:latin typeface="メイリオ"/>
+                  <a:ea typeface="メイリオ"/>
+                  <a:cs typeface="メイリオ"/>
+                </a:rPr>
+                <a:t>チェックされている</a:t>
+              </a:r>
+              <a:endParaRPr lang="en-US" altLang="en-US" sz="1400" dirty="0" smtClean="0">
+                <a:latin typeface="メイリオ"/>
+                <a:ea typeface="メイリオ"/>
+                <a:cs typeface="メイリオ"/>
+              </a:endParaRPr>
+            </a:p>
+          </p:txBody>
+        </p:sp>
+      </p:grpSp>
+    </p:spTree>
+    <p:extLst>
+      <p:ext uri="{BB962C8B-B14F-4D97-AF65-F5344CB8AC3E}">
+        <p14:creationId xmlns:p14="http://schemas.microsoft.com/office/powerpoint/2010/main" val="1724035557"/>
+      </p:ext>
+    </p:extLst>
+  </p:cSld>
+  <p:clrMapOvr>
+    <a:masterClrMapping/>
+  </p:clrMapOvr>
+</p:sld>
+</file>
+
+<file path=ppt/slides/slide3.xml><?xml version="1.0" encoding="utf-8"?>
+<p:sld xmlns:a="http://schemas.openxmlformats.org/drawingml/2006/main" xmlns:r="http://schemas.openxmlformats.org/officeDocument/2006/relationships" xmlns:p="http://schemas.openxmlformats.org/presentationml/2006/main">
+  <p:cSld>
+    <p:spTree>
+      <p:nvGrpSpPr>
+        <p:cNvPr id="1" name=""/>
+        <p:cNvGrpSpPr/>
+        <p:nvPr/>
+      </p:nvGrpSpPr>
+      <p:grpSpPr>
+        <a:xfrm>
+          <a:off x="0" y="0"/>
+          <a:ext cx="0" cy="0"/>
+          <a:chOff x="0" y="0"/>
+          <a:chExt cx="0" cy="0"/>
+        </a:xfrm>
+      </p:grpSpPr>
       <p:sp>
         <p:nvSpPr>
-          <p:cNvPr id="33" name="テキスト ボックス 32"/>
+          <p:cNvPr id="4" name="テキスト ボックス 3"/>
           <p:cNvSpPr txBox="1"/>
           <p:nvPr/>
         </p:nvSpPr>
         <p:spPr>
           <a:xfrm>
-            <a:off x="5285980" y="4807152"/>
-            <a:ext cx="2159566" cy="523220"/>
+            <a:off x="200532" y="187161"/>
+            <a:ext cx="3057247" cy="523220"/>
           </a:xfrm>
           <a:prstGeom prst="rect">
             <a:avLst/>
@@ -5169,75 +5785,22 @@
           <a:lstStyle/>
           <a:p>
             <a:r>
-              <a:rPr lang="en-US" altLang="en-US" sz="1400" dirty="0" smtClean="0">
+              <a:rPr lang="ja-JP" altLang="en-US" sz="2800" dirty="0" smtClean="0">
                 <a:latin typeface="メイリオ"/>
                 <a:ea typeface="メイリオ"/>
                 <a:cs typeface="メイリオ"/>
               </a:rPr>
-              <a:t>アプリ起動時の月の収支</a:t>
-            </a:r>
-          </a:p>
-          <a:p>
-            <a:r>
-              <a:rPr lang="en-US" altLang="en-US" sz="1400" dirty="0" smtClean="0">
+              <a:t>カテゴリ選択</a:t>
+            </a:r>
+            <a:r>
+              <a:rPr lang="ja-JP" altLang="en-US" sz="2800" dirty="0" smtClean="0">
                 <a:latin typeface="メイリオ"/>
                 <a:ea typeface="メイリオ"/>
                 <a:cs typeface="メイリオ"/>
               </a:rPr>
-              <a:t>が表示される</a:t>
-            </a:r>
-          </a:p>
-        </p:txBody>
-      </p:sp>
-      <p:sp>
-        <p:nvSpPr>
-          <p:cNvPr id="28" name="円形吹き出し 27"/>
-          <p:cNvSpPr/>
-          <p:nvPr/>
-        </p:nvSpPr>
-        <p:spPr>
-          <a:xfrm>
-            <a:off x="5443408" y="1665279"/>
-            <a:ext cx="2409517" cy="872852"/>
-          </a:xfrm>
-          <a:prstGeom prst="wedgeEllipseCallout">
-            <a:avLst>
-              <a:gd name="adj1" fmla="val -47434"/>
-              <a:gd name="adj2" fmla="val -62691"/>
-            </a:avLst>
-          </a:prstGeom>
-          <a:solidFill>
-            <a:schemeClr val="bg1"/>
-          </a:solidFill>
-          <a:ln w="19050">
-            <a:solidFill>
-              <a:srgbClr val="008000"/>
-            </a:solidFill>
-          </a:ln>
-        </p:spPr>
-        <p:style>
-          <a:lnRef idx="1">
-            <a:schemeClr val="accent1"/>
-          </a:lnRef>
-          <a:fillRef idx="3">
-            <a:schemeClr val="accent1"/>
-          </a:fillRef>
-          <a:effectRef idx="2">
-            <a:schemeClr val="accent1"/>
-          </a:effectRef>
-          <a:fontRef idx="minor">
-            <a:schemeClr val="lt1"/>
-          </a:fontRef>
-        </p:style>
-        <p:txBody>
-          <a:bodyPr rtlCol="0" anchor="ctr"/>
-          <a:lstStyle/>
-          <a:p>
-            <a:pPr algn="ctr"/>
-            <a:endParaRPr kumimoji="1" lang="ja-JP" altLang="en-US" sz="1400" dirty="0">
-              <a:solidFill>
-                <a:schemeClr val="tx1"/>
-              </a:solidFill>
+              <a:t>画面</a:t>
+            </a:r>
+            <a:endParaRPr kumimoji="1" lang="ja-JP" altLang="en-US" sz="2000" dirty="0">
               <a:latin typeface="メイリオ"/>
               <a:ea typeface="メイリオ"/>
               <a:cs typeface="メイリオ"/>
@@ -5245,66 +5808,1869 @@
           </a:p>
         </p:txBody>
       </p:sp>
-      <p:sp>
-        <p:nvSpPr>
-          <p:cNvPr id="29" name="テキスト ボックス 28"/>
-          <p:cNvSpPr txBox="1"/>
+      <p:grpSp>
+        <p:nvGrpSpPr>
+          <p:cNvPr id="59" name="図形グループ 58"/>
+          <p:cNvGrpSpPr/>
           <p:nvPr/>
-        </p:nvSpPr>
-        <p:spPr>
+        </p:nvGrpSpPr>
+        <p:grpSpPr>
           <a:xfrm>
-            <a:off x="5648428" y="1837660"/>
-            <a:ext cx="1980029" cy="523220"/>
+            <a:off x="2399632" y="815476"/>
+            <a:ext cx="4130842" cy="5788523"/>
+            <a:chOff x="2399632" y="815476"/>
+            <a:chExt cx="4130842" cy="5788523"/>
           </a:xfrm>
-          <a:prstGeom prst="rect">
-            <a:avLst/>
-          </a:prstGeom>
-          <a:noFill/>
-        </p:spPr>
-        <p:txBody>
-          <a:bodyPr wrap="none" rtlCol="0">
-            <a:spAutoFit/>
-          </a:bodyPr>
-          <a:lstStyle/>
-          <a:p>
-            <a:r>
-              <a:rPr lang="ja-JP" altLang="en-US" sz="1400" dirty="0" smtClean="0">
+        </p:grpSpPr>
+        <p:grpSp>
+          <p:nvGrpSpPr>
+            <p:cNvPr id="6" name="図形グループ 5"/>
+            <p:cNvGrpSpPr/>
+            <p:nvPr/>
+          </p:nvGrpSpPr>
+          <p:grpSpPr>
+            <a:xfrm>
+              <a:off x="2399632" y="815476"/>
+              <a:ext cx="4130842" cy="5788523"/>
+              <a:chOff x="2399632" y="815476"/>
+              <a:chExt cx="4130842" cy="5788523"/>
+            </a:xfrm>
+          </p:grpSpPr>
+          <p:sp>
+            <p:nvSpPr>
+              <p:cNvPr id="5" name="正方形/長方形 4"/>
+              <p:cNvSpPr/>
+              <p:nvPr/>
+            </p:nvSpPr>
+            <p:spPr>
+              <a:xfrm>
+                <a:off x="2399632" y="815476"/>
+                <a:ext cx="4130842" cy="5788523"/>
+              </a:xfrm>
+              <a:prstGeom prst="rect">
+                <a:avLst/>
+              </a:prstGeom>
+              <a:noFill/>
+              <a:ln w="25400">
+                <a:solidFill>
+                  <a:schemeClr val="tx1"/>
+                </a:solidFill>
+              </a:ln>
+              <a:effectLst/>
+            </p:spPr>
+            <p:style>
+              <a:lnRef idx="1">
+                <a:schemeClr val="accent1"/>
+              </a:lnRef>
+              <a:fillRef idx="3">
+                <a:schemeClr val="accent1"/>
+              </a:fillRef>
+              <a:effectRef idx="2">
+                <a:schemeClr val="accent1"/>
+              </a:effectRef>
+              <a:fontRef idx="minor">
+                <a:schemeClr val="lt1"/>
+              </a:fontRef>
+            </p:style>
+            <p:txBody>
+              <a:bodyPr rtlCol="0" anchor="ctr"/>
+              <a:lstStyle/>
+              <a:p>
+                <a:pPr algn="ctr"/>
+                <a:endParaRPr kumimoji="1" lang="ja-JP" altLang="en-US" sz="2800" dirty="0">
+                  <a:solidFill>
+                    <a:schemeClr val="tx1"/>
+                  </a:solidFill>
+                  <a:latin typeface="メイリオ"/>
+                  <a:ea typeface="メイリオ"/>
+                  <a:cs typeface="メイリオ"/>
+                </a:endParaRPr>
+              </a:p>
+            </p:txBody>
+          </p:sp>
+          <p:sp>
+            <p:nvSpPr>
+              <p:cNvPr id="13" name="テキスト ボックス 12"/>
+              <p:cNvSpPr txBox="1"/>
+              <p:nvPr/>
+            </p:nvSpPr>
+            <p:spPr>
+              <a:xfrm>
+                <a:off x="3041515" y="1295947"/>
+                <a:ext cx="877163" cy="369332"/>
+              </a:xfrm>
+              <a:prstGeom prst="rect">
+                <a:avLst/>
+              </a:prstGeom>
+              <a:noFill/>
+              <a:ln>
+                <a:noFill/>
+              </a:ln>
+            </p:spPr>
+            <p:txBody>
+              <a:bodyPr wrap="none" rtlCol="0">
+                <a:spAutoFit/>
+              </a:bodyPr>
+              <a:lstStyle/>
+              <a:p>
+                <a:r>
+                  <a:rPr kumimoji="1" lang="ja-JP" altLang="en-US" dirty="0" smtClean="0">
+                    <a:latin typeface="メイリオ"/>
+                    <a:ea typeface="メイリオ"/>
+                    <a:cs typeface="メイリオ"/>
+                  </a:rPr>
+                  <a:t>日付：</a:t>
+                </a:r>
+                <a:endParaRPr kumimoji="1" lang="ja-JP" altLang="en-US" dirty="0">
+                  <a:latin typeface="メイリオ"/>
+                  <a:ea typeface="メイリオ"/>
+                  <a:cs typeface="メイリオ"/>
+                </a:endParaRPr>
+              </a:p>
+            </p:txBody>
+          </p:sp>
+          <p:sp>
+            <p:nvSpPr>
+              <p:cNvPr id="14" name="テキスト ボックス 13"/>
+              <p:cNvSpPr txBox="1"/>
+              <p:nvPr/>
+            </p:nvSpPr>
+            <p:spPr>
+              <a:xfrm>
+                <a:off x="3041515" y="1811337"/>
+                <a:ext cx="877163" cy="369332"/>
+              </a:xfrm>
+              <a:prstGeom prst="rect">
+                <a:avLst/>
+              </a:prstGeom>
+              <a:noFill/>
+              <a:ln>
+                <a:noFill/>
+              </a:ln>
+            </p:spPr>
+            <p:txBody>
+              <a:bodyPr wrap="none" rtlCol="0">
+                <a:spAutoFit/>
+              </a:bodyPr>
+              <a:lstStyle/>
+              <a:p>
+                <a:r>
+                  <a:rPr lang="ja-JP" altLang="en-US" dirty="0" smtClean="0">
+                    <a:latin typeface="メイリオ"/>
+                    <a:ea typeface="メイリオ"/>
+                    <a:cs typeface="メイリオ"/>
+                  </a:rPr>
+                  <a:t>内容</a:t>
+                </a:r>
+                <a:r>
+                  <a:rPr kumimoji="1" lang="ja-JP" altLang="en-US" dirty="0" smtClean="0">
+                    <a:latin typeface="メイリオ"/>
+                    <a:ea typeface="メイリオ"/>
+                    <a:cs typeface="メイリオ"/>
+                  </a:rPr>
+                  <a:t>：</a:t>
+                </a:r>
+                <a:endParaRPr kumimoji="1" lang="ja-JP" altLang="en-US" dirty="0">
+                  <a:latin typeface="メイリオ"/>
+                  <a:ea typeface="メイリオ"/>
+                  <a:cs typeface="メイリオ"/>
+                </a:endParaRPr>
+              </a:p>
+            </p:txBody>
+          </p:sp>
+          <p:sp>
+            <p:nvSpPr>
+              <p:cNvPr id="15" name="テキスト ボックス 14"/>
+              <p:cNvSpPr txBox="1"/>
+              <p:nvPr/>
+            </p:nvSpPr>
+            <p:spPr>
+              <a:xfrm>
+                <a:off x="2579850" y="2326727"/>
+                <a:ext cx="1338828" cy="369332"/>
+              </a:xfrm>
+              <a:prstGeom prst="rect">
+                <a:avLst/>
+              </a:prstGeom>
+              <a:noFill/>
+              <a:ln>
+                <a:noFill/>
+              </a:ln>
+            </p:spPr>
+            <p:txBody>
+              <a:bodyPr wrap="none" rtlCol="0">
+                <a:spAutoFit/>
+              </a:bodyPr>
+              <a:lstStyle/>
+              <a:p>
+                <a:r>
+                  <a:rPr lang="ja-JP" altLang="en-US" dirty="0" smtClean="0">
+                    <a:latin typeface="メイリオ"/>
+                    <a:ea typeface="メイリオ"/>
+                    <a:cs typeface="メイリオ"/>
+                  </a:rPr>
+                  <a:t>カテゴリ</a:t>
+                </a:r>
+                <a:r>
+                  <a:rPr kumimoji="1" lang="ja-JP" altLang="en-US" dirty="0" smtClean="0">
+                    <a:latin typeface="メイリオ"/>
+                    <a:ea typeface="メイリオ"/>
+                    <a:cs typeface="メイリオ"/>
+                  </a:rPr>
+                  <a:t>：</a:t>
+                </a:r>
+                <a:endParaRPr kumimoji="1" lang="ja-JP" altLang="en-US" dirty="0">
+                  <a:latin typeface="メイリオ"/>
+                  <a:ea typeface="メイリオ"/>
+                  <a:cs typeface="メイリオ"/>
+                </a:endParaRPr>
+              </a:p>
+            </p:txBody>
+          </p:sp>
+          <p:sp>
+            <p:nvSpPr>
+              <p:cNvPr id="16" name="テキスト ボックス 15"/>
+              <p:cNvSpPr txBox="1"/>
+              <p:nvPr/>
+            </p:nvSpPr>
+            <p:spPr>
+              <a:xfrm>
+                <a:off x="3041515" y="2842117"/>
+                <a:ext cx="877163" cy="369332"/>
+              </a:xfrm>
+              <a:prstGeom prst="rect">
+                <a:avLst/>
+              </a:prstGeom>
+              <a:noFill/>
+              <a:ln>
+                <a:noFill/>
+              </a:ln>
+            </p:spPr>
+            <p:txBody>
+              <a:bodyPr wrap="none" rtlCol="0">
+                <a:spAutoFit/>
+              </a:bodyPr>
+              <a:lstStyle/>
+              <a:p>
+                <a:r>
+                  <a:rPr lang="ja-JP" altLang="en-US" dirty="0" smtClean="0">
+                    <a:latin typeface="メイリオ"/>
+                    <a:ea typeface="メイリオ"/>
+                    <a:cs typeface="メイリオ"/>
+                  </a:rPr>
+                  <a:t>金額</a:t>
+                </a:r>
+                <a:r>
+                  <a:rPr kumimoji="1" lang="ja-JP" altLang="en-US" dirty="0" smtClean="0">
+                    <a:latin typeface="メイリオ"/>
+                    <a:ea typeface="メイリオ"/>
+                    <a:cs typeface="メイリオ"/>
+                  </a:rPr>
+                  <a:t>：</a:t>
+                </a:r>
+                <a:endParaRPr kumimoji="1" lang="ja-JP" altLang="en-US" dirty="0">
+                  <a:latin typeface="メイリオ"/>
+                  <a:ea typeface="メイリオ"/>
+                  <a:cs typeface="メイリオ"/>
+                </a:endParaRPr>
+              </a:p>
+            </p:txBody>
+          </p:sp>
+          <p:sp>
+            <p:nvSpPr>
+              <p:cNvPr id="18" name="角丸四角形 17"/>
+              <p:cNvSpPr/>
+              <p:nvPr/>
+            </p:nvSpPr>
+            <p:spPr>
+              <a:xfrm>
+                <a:off x="3041515" y="5982125"/>
+                <a:ext cx="1243263" cy="360947"/>
+              </a:xfrm>
+              <a:prstGeom prst="roundRect">
+                <a:avLst/>
+              </a:prstGeom>
+              <a:noFill/>
+              <a:ln w="25400">
+                <a:solidFill>
+                  <a:schemeClr val="tx1"/>
+                </a:solidFill>
+              </a:ln>
+              <a:effectLst/>
+            </p:spPr>
+            <p:style>
+              <a:lnRef idx="1">
+                <a:schemeClr val="accent1"/>
+              </a:lnRef>
+              <a:fillRef idx="3">
+                <a:schemeClr val="accent1"/>
+              </a:fillRef>
+              <a:effectRef idx="2">
+                <a:schemeClr val="accent1"/>
+              </a:effectRef>
+              <a:fontRef idx="minor">
+                <a:schemeClr val="lt1"/>
+              </a:fontRef>
+            </p:style>
+            <p:txBody>
+              <a:bodyPr rtlCol="0" anchor="ctr"/>
+              <a:lstStyle/>
+              <a:p>
+                <a:pPr algn="ctr"/>
+                <a:r>
+                  <a:rPr lang="ja-JP" altLang="en-US" dirty="0" smtClean="0">
+                    <a:solidFill>
+                      <a:schemeClr val="tx1"/>
+                    </a:solidFill>
+                    <a:latin typeface="メイリオ"/>
+                    <a:ea typeface="メイリオ"/>
+                    <a:cs typeface="メイリオ"/>
+                  </a:rPr>
+                  <a:t>登録</a:t>
+                </a:r>
+                <a:endParaRPr lang="en-US" altLang="ja-JP" dirty="0" smtClean="0">
+                  <a:solidFill>
+                    <a:schemeClr val="tx1"/>
+                  </a:solidFill>
+                  <a:latin typeface="メイリオ"/>
+                  <a:ea typeface="メイリオ"/>
+                  <a:cs typeface="メイリオ"/>
+                </a:endParaRPr>
+              </a:p>
+            </p:txBody>
+          </p:sp>
+          <p:sp>
+            <p:nvSpPr>
+              <p:cNvPr id="19" name="角丸四角形 18"/>
+              <p:cNvSpPr/>
+              <p:nvPr/>
+            </p:nvSpPr>
+            <p:spPr>
+              <a:xfrm>
+                <a:off x="4610962" y="5982125"/>
+                <a:ext cx="1243263" cy="360947"/>
+              </a:xfrm>
+              <a:prstGeom prst="roundRect">
+                <a:avLst/>
+              </a:prstGeom>
+              <a:noFill/>
+              <a:ln w="25400">
+                <a:solidFill>
+                  <a:schemeClr val="tx1"/>
+                </a:solidFill>
+              </a:ln>
+              <a:effectLst/>
+            </p:spPr>
+            <p:style>
+              <a:lnRef idx="1">
+                <a:schemeClr val="accent1"/>
+              </a:lnRef>
+              <a:fillRef idx="3">
+                <a:schemeClr val="accent1"/>
+              </a:fillRef>
+              <a:effectRef idx="2">
+                <a:schemeClr val="accent1"/>
+              </a:effectRef>
+              <a:fontRef idx="minor">
+                <a:schemeClr val="lt1"/>
+              </a:fontRef>
+            </p:style>
+            <p:txBody>
+              <a:bodyPr rtlCol="0" anchor="ctr"/>
+              <a:lstStyle/>
+              <a:p>
+                <a:pPr algn="ctr"/>
+                <a:r>
+                  <a:rPr lang="ja-JP" altLang="en-US" dirty="0" smtClean="0">
+                    <a:solidFill>
+                      <a:schemeClr val="tx1"/>
+                    </a:solidFill>
+                    <a:latin typeface="メイリオ"/>
+                    <a:ea typeface="メイリオ"/>
+                    <a:cs typeface="メイリオ"/>
+                  </a:rPr>
+                  <a:t>取消</a:t>
+                </a:r>
+                <a:endParaRPr lang="en-US" altLang="ja-JP" dirty="0" smtClean="0">
+                  <a:solidFill>
+                    <a:schemeClr val="tx1"/>
+                  </a:solidFill>
+                  <a:latin typeface="メイリオ"/>
+                  <a:ea typeface="メイリオ"/>
+                  <a:cs typeface="メイリオ"/>
+                </a:endParaRPr>
+              </a:p>
+            </p:txBody>
+          </p:sp>
+          <p:sp>
+            <p:nvSpPr>
+              <p:cNvPr id="20" name="正方形/長方形 19"/>
+              <p:cNvSpPr/>
+              <p:nvPr/>
+            </p:nvSpPr>
+            <p:spPr>
+              <a:xfrm>
+                <a:off x="3918678" y="1295947"/>
+                <a:ext cx="1935547" cy="369332"/>
+              </a:xfrm>
+              <a:prstGeom prst="rect">
+                <a:avLst/>
+              </a:prstGeom>
+              <a:noFill/>
+              <a:ln w="25400">
+                <a:solidFill>
+                  <a:schemeClr val="tx1"/>
+                </a:solidFill>
+              </a:ln>
+              <a:effectLst/>
+            </p:spPr>
+            <p:style>
+              <a:lnRef idx="1">
+                <a:schemeClr val="accent1"/>
+              </a:lnRef>
+              <a:fillRef idx="3">
+                <a:schemeClr val="accent1"/>
+              </a:fillRef>
+              <a:effectRef idx="2">
+                <a:schemeClr val="accent1"/>
+              </a:effectRef>
+              <a:fontRef idx="minor">
+                <a:schemeClr val="lt1"/>
+              </a:fontRef>
+            </p:style>
+            <p:txBody>
+              <a:bodyPr rtlCol="0" anchor="ctr"/>
+              <a:lstStyle/>
+              <a:p>
+                <a:pPr algn="ctr"/>
+                <a:endParaRPr kumimoji="1" lang="ja-JP" altLang="en-US">
+                  <a:solidFill>
+                    <a:schemeClr val="tx1"/>
+                  </a:solidFill>
+                </a:endParaRPr>
+              </a:p>
+            </p:txBody>
+          </p:sp>
+          <p:sp>
+            <p:nvSpPr>
+              <p:cNvPr id="21" name="正方形/長方形 20"/>
+              <p:cNvSpPr/>
+              <p:nvPr/>
+            </p:nvSpPr>
+            <p:spPr>
+              <a:xfrm>
+                <a:off x="3918678" y="1814570"/>
+                <a:ext cx="1935547" cy="369332"/>
+              </a:xfrm>
+              <a:prstGeom prst="rect">
+                <a:avLst/>
+              </a:prstGeom>
+              <a:noFill/>
+              <a:ln w="25400">
+                <a:solidFill>
+                  <a:schemeClr val="tx1"/>
+                </a:solidFill>
+              </a:ln>
+              <a:effectLst/>
+            </p:spPr>
+            <p:style>
+              <a:lnRef idx="1">
+                <a:schemeClr val="accent1"/>
+              </a:lnRef>
+              <a:fillRef idx="3">
+                <a:schemeClr val="accent1"/>
+              </a:fillRef>
+              <a:effectRef idx="2">
+                <a:schemeClr val="accent1"/>
+              </a:effectRef>
+              <a:fontRef idx="minor">
+                <a:schemeClr val="lt1"/>
+              </a:fontRef>
+            </p:style>
+            <p:txBody>
+              <a:bodyPr rtlCol="0" anchor="ctr"/>
+              <a:lstStyle/>
+              <a:p>
+                <a:pPr algn="ctr"/>
+                <a:endParaRPr kumimoji="1" lang="ja-JP" altLang="en-US">
+                  <a:solidFill>
+                    <a:schemeClr val="tx1"/>
+                  </a:solidFill>
+                </a:endParaRPr>
+              </a:p>
+            </p:txBody>
+          </p:sp>
+          <p:sp>
+            <p:nvSpPr>
+              <p:cNvPr id="22" name="正方形/長方形 21"/>
+              <p:cNvSpPr/>
+              <p:nvPr/>
+            </p:nvSpPr>
+            <p:spPr>
+              <a:xfrm>
+                <a:off x="3918678" y="2842117"/>
+                <a:ext cx="1935547" cy="369332"/>
+              </a:xfrm>
+              <a:prstGeom prst="rect">
+                <a:avLst/>
+              </a:prstGeom>
+              <a:noFill/>
+              <a:ln w="25400">
+                <a:solidFill>
+                  <a:schemeClr val="tx1"/>
+                </a:solidFill>
+              </a:ln>
+              <a:effectLst/>
+            </p:spPr>
+            <p:style>
+              <a:lnRef idx="1">
+                <a:schemeClr val="accent1"/>
+              </a:lnRef>
+              <a:fillRef idx="3">
+                <a:schemeClr val="accent1"/>
+              </a:fillRef>
+              <a:effectRef idx="2">
+                <a:schemeClr val="accent1"/>
+              </a:effectRef>
+              <a:fontRef idx="minor">
+                <a:schemeClr val="lt1"/>
+              </a:fontRef>
+            </p:style>
+            <p:txBody>
+              <a:bodyPr rtlCol="0" anchor="ctr"/>
+              <a:lstStyle/>
+              <a:p>
+                <a:pPr algn="ctr"/>
+                <a:endParaRPr kumimoji="1" lang="ja-JP" altLang="en-US">
+                  <a:solidFill>
+                    <a:schemeClr val="tx1"/>
+                  </a:solidFill>
+                </a:endParaRPr>
+              </a:p>
+            </p:txBody>
+          </p:sp>
+          <p:sp>
+            <p:nvSpPr>
+              <p:cNvPr id="23" name="正方形/長方形 22"/>
+              <p:cNvSpPr/>
+              <p:nvPr/>
+            </p:nvSpPr>
+            <p:spPr>
+              <a:xfrm>
+                <a:off x="3918678" y="2326727"/>
+                <a:ext cx="1935547" cy="369332"/>
+              </a:xfrm>
+              <a:prstGeom prst="rect">
+                <a:avLst/>
+              </a:prstGeom>
+              <a:noFill/>
+              <a:ln w="25400">
+                <a:solidFill>
+                  <a:schemeClr val="tx1"/>
+                </a:solidFill>
+              </a:ln>
+              <a:effectLst/>
+            </p:spPr>
+            <p:style>
+              <a:lnRef idx="1">
+                <a:schemeClr val="accent1"/>
+              </a:lnRef>
+              <a:fillRef idx="3">
+                <a:schemeClr val="accent1"/>
+              </a:fillRef>
+              <a:effectRef idx="2">
+                <a:schemeClr val="accent1"/>
+              </a:effectRef>
+              <a:fontRef idx="minor">
+                <a:schemeClr val="lt1"/>
+              </a:fontRef>
+            </p:style>
+            <p:txBody>
+              <a:bodyPr rtlCol="0" anchor="ctr"/>
+              <a:lstStyle/>
+              <a:p>
+                <a:pPr algn="ctr"/>
+                <a:endParaRPr kumimoji="1" lang="ja-JP" altLang="en-US">
+                  <a:solidFill>
+                    <a:schemeClr val="tx1"/>
+                  </a:solidFill>
+                </a:endParaRPr>
+              </a:p>
+            </p:txBody>
+          </p:sp>
+          <p:sp>
+            <p:nvSpPr>
+              <p:cNvPr id="24" name="円/楕円 23"/>
+              <p:cNvSpPr/>
+              <p:nvPr/>
+            </p:nvSpPr>
+            <p:spPr>
+              <a:xfrm>
+                <a:off x="3635449" y="3464224"/>
+                <a:ext cx="163286" cy="179456"/>
+              </a:xfrm>
+              <a:prstGeom prst="ellipse">
+                <a:avLst/>
+              </a:prstGeom>
+              <a:solidFill>
+                <a:schemeClr val="tx1"/>
+              </a:solidFill>
+              <a:ln>
+                <a:solidFill>
+                  <a:schemeClr val="tx1"/>
+                </a:solidFill>
+              </a:ln>
+              <a:effectLst/>
+            </p:spPr>
+            <p:style>
+              <a:lnRef idx="1">
+                <a:schemeClr val="accent1"/>
+              </a:lnRef>
+              <a:fillRef idx="3">
+                <a:schemeClr val="accent1"/>
+              </a:fillRef>
+              <a:effectRef idx="2">
+                <a:schemeClr val="accent1"/>
+              </a:effectRef>
+              <a:fontRef idx="minor">
+                <a:schemeClr val="lt1"/>
+              </a:fontRef>
+            </p:style>
+            <p:txBody>
+              <a:bodyPr rtlCol="0" anchor="ctr"/>
+              <a:lstStyle/>
+              <a:p>
+                <a:pPr algn="ctr"/>
+                <a:endParaRPr kumimoji="1" lang="ja-JP" altLang="en-US">
+                  <a:solidFill>
+                    <a:schemeClr val="tx1"/>
+                  </a:solidFill>
+                </a:endParaRPr>
+              </a:p>
+            </p:txBody>
+          </p:sp>
+          <p:sp>
+            <p:nvSpPr>
+              <p:cNvPr id="25" name="テキスト ボックス 24"/>
+              <p:cNvSpPr txBox="1"/>
+              <p:nvPr/>
+            </p:nvSpPr>
+            <p:spPr>
+              <a:xfrm>
+                <a:off x="3814371" y="3370783"/>
+                <a:ext cx="646331" cy="369332"/>
+              </a:xfrm>
+              <a:prstGeom prst="rect">
+                <a:avLst/>
+              </a:prstGeom>
+              <a:noFill/>
+              <a:ln>
+                <a:noFill/>
+              </a:ln>
+            </p:spPr>
+            <p:txBody>
+              <a:bodyPr wrap="none" rtlCol="0">
+                <a:spAutoFit/>
+              </a:bodyPr>
+              <a:lstStyle/>
+              <a:p>
+                <a:r>
+                  <a:rPr lang="ja-JP" altLang="en-US" dirty="0" smtClean="0">
+                    <a:latin typeface="メイリオ"/>
+                    <a:ea typeface="メイリオ"/>
+                    <a:cs typeface="メイリオ"/>
+                  </a:rPr>
+                  <a:t>収入</a:t>
+                </a:r>
+                <a:endParaRPr kumimoji="1" lang="ja-JP" altLang="en-US" dirty="0">
+                  <a:latin typeface="メイリオ"/>
+                  <a:ea typeface="メイリオ"/>
+                  <a:cs typeface="メイリオ"/>
+                </a:endParaRPr>
+              </a:p>
+            </p:txBody>
+          </p:sp>
+          <p:sp>
+            <p:nvSpPr>
+              <p:cNvPr id="26" name="円/楕円 25"/>
+              <p:cNvSpPr/>
+              <p:nvPr/>
+            </p:nvSpPr>
+            <p:spPr>
+              <a:xfrm>
+                <a:off x="4530000" y="3467034"/>
+                <a:ext cx="163286" cy="179456"/>
+              </a:xfrm>
+              <a:prstGeom prst="ellipse">
+                <a:avLst/>
+              </a:prstGeom>
+              <a:solidFill>
+                <a:schemeClr val="tx1"/>
+              </a:solidFill>
+              <a:ln>
+                <a:solidFill>
+                  <a:schemeClr val="tx1"/>
+                </a:solidFill>
+              </a:ln>
+              <a:effectLst/>
+            </p:spPr>
+            <p:style>
+              <a:lnRef idx="1">
+                <a:schemeClr val="accent1"/>
+              </a:lnRef>
+              <a:fillRef idx="3">
+                <a:schemeClr val="accent1"/>
+              </a:fillRef>
+              <a:effectRef idx="2">
+                <a:schemeClr val="accent1"/>
+              </a:effectRef>
+              <a:fontRef idx="minor">
+                <a:schemeClr val="lt1"/>
+              </a:fontRef>
+            </p:style>
+            <p:txBody>
+              <a:bodyPr rtlCol="0" anchor="ctr"/>
+              <a:lstStyle/>
+              <a:p>
+                <a:pPr algn="ctr"/>
+                <a:endParaRPr kumimoji="1" lang="ja-JP" altLang="en-US">
+                  <a:solidFill>
+                    <a:schemeClr val="tx1"/>
+                  </a:solidFill>
+                </a:endParaRPr>
+              </a:p>
+            </p:txBody>
+          </p:sp>
+          <p:sp>
+            <p:nvSpPr>
+              <p:cNvPr id="27" name="テキスト ボックス 26"/>
+              <p:cNvSpPr txBox="1"/>
+              <p:nvPr/>
+            </p:nvSpPr>
+            <p:spPr>
+              <a:xfrm>
+                <a:off x="4708922" y="3360225"/>
+                <a:ext cx="646331" cy="369332"/>
+              </a:xfrm>
+              <a:prstGeom prst="rect">
+                <a:avLst/>
+              </a:prstGeom>
+              <a:noFill/>
+              <a:ln>
+                <a:noFill/>
+              </a:ln>
+            </p:spPr>
+            <p:txBody>
+              <a:bodyPr wrap="none" rtlCol="0">
+                <a:spAutoFit/>
+              </a:bodyPr>
+              <a:lstStyle/>
+              <a:p>
+                <a:r>
+                  <a:rPr lang="ja-JP" altLang="en-US" dirty="0" smtClean="0">
+                    <a:latin typeface="メイリオ"/>
+                    <a:ea typeface="メイリオ"/>
+                    <a:cs typeface="メイリオ"/>
+                  </a:rPr>
+                  <a:t>支出</a:t>
+                </a:r>
+                <a:endParaRPr kumimoji="1" lang="ja-JP" altLang="en-US" dirty="0">
+                  <a:latin typeface="メイリオ"/>
+                  <a:ea typeface="メイリオ"/>
+                  <a:cs typeface="メイリオ"/>
+                </a:endParaRPr>
+              </a:p>
+            </p:txBody>
+          </p:sp>
+          <p:sp>
+            <p:nvSpPr>
+              <p:cNvPr id="3" name="テキスト ボックス 2"/>
+              <p:cNvSpPr txBox="1"/>
+              <p:nvPr/>
+            </p:nvSpPr>
+            <p:spPr>
+              <a:xfrm>
+                <a:off x="3974436" y="1295947"/>
+                <a:ext cx="1468972" cy="338554"/>
+              </a:xfrm>
+              <a:prstGeom prst="rect">
+                <a:avLst/>
+              </a:prstGeom>
+              <a:noFill/>
+            </p:spPr>
+            <p:txBody>
+              <a:bodyPr wrap="none" rtlCol="0">
+                <a:spAutoFit/>
+              </a:bodyPr>
+              <a:lstStyle/>
+              <a:p>
+                <a:r>
+                  <a:rPr kumimoji="1" lang="en-US" altLang="ja-JP" sz="1600" dirty="0" err="1" smtClean="0">
+                    <a:latin typeface="メイリオ"/>
+                    <a:ea typeface="メイリオ"/>
+                    <a:cs typeface="メイリオ"/>
+                  </a:rPr>
+                  <a:t>yyyy</a:t>
+                </a:r>
+                <a:r>
+                  <a:rPr kumimoji="1" lang="en-US" altLang="ja-JP" sz="1600" dirty="0" smtClean="0">
+                    <a:latin typeface="メイリオ"/>
+                    <a:ea typeface="メイリオ"/>
+                    <a:cs typeface="メイリオ"/>
+                  </a:rPr>
+                  <a:t>-mm-</a:t>
+                </a:r>
+                <a:r>
+                  <a:rPr kumimoji="1" lang="en-US" altLang="ja-JP" sz="1600" dirty="0" err="1" smtClean="0">
+                    <a:latin typeface="メイリオ"/>
+                    <a:ea typeface="メイリオ"/>
+                    <a:cs typeface="メイリオ"/>
+                  </a:rPr>
+                  <a:t>dd</a:t>
+                </a:r>
+                <a:endParaRPr kumimoji="1" lang="ja-JP" altLang="en-US" sz="1600" dirty="0">
+                  <a:latin typeface="メイリオ"/>
+                  <a:ea typeface="メイリオ"/>
+                  <a:cs typeface="メイリオ"/>
+                </a:endParaRPr>
+              </a:p>
+            </p:txBody>
+          </p:sp>
+          <p:sp>
+            <p:nvSpPr>
+              <p:cNvPr id="30" name="テキスト ボックス 29"/>
+              <p:cNvSpPr txBox="1"/>
+              <p:nvPr/>
+            </p:nvSpPr>
+            <p:spPr>
+              <a:xfrm>
+                <a:off x="3041515" y="4056699"/>
+                <a:ext cx="877163" cy="369332"/>
+              </a:xfrm>
+              <a:prstGeom prst="rect">
+                <a:avLst/>
+              </a:prstGeom>
+              <a:noFill/>
+              <a:ln>
+                <a:noFill/>
+              </a:ln>
+            </p:spPr>
+            <p:txBody>
+              <a:bodyPr wrap="none" rtlCol="0">
+                <a:spAutoFit/>
+              </a:bodyPr>
+              <a:lstStyle/>
+              <a:p>
+                <a:r>
+                  <a:rPr lang="en-US" altLang="en-US" dirty="0" smtClean="0">
+                    <a:latin typeface="メイリオ"/>
+                    <a:ea typeface="メイリオ"/>
+                    <a:cs typeface="メイリオ"/>
+                  </a:rPr>
+                  <a:t>収支</a:t>
+                </a:r>
+                <a:r>
+                  <a:rPr kumimoji="1" lang="ja-JP" altLang="en-US" dirty="0" smtClean="0">
+                    <a:latin typeface="メイリオ"/>
+                    <a:ea typeface="メイリオ"/>
+                    <a:cs typeface="メイリオ"/>
+                  </a:rPr>
+                  <a:t>：</a:t>
+                </a:r>
+                <a:endParaRPr kumimoji="1" lang="ja-JP" altLang="en-US" dirty="0">
+                  <a:latin typeface="メイリオ"/>
+                  <a:ea typeface="メイリオ"/>
+                  <a:cs typeface="メイリオ"/>
+                </a:endParaRPr>
+              </a:p>
+            </p:txBody>
+          </p:sp>
+          <p:sp>
+            <p:nvSpPr>
+              <p:cNvPr id="31" name="テキスト ボックス 30"/>
+              <p:cNvSpPr txBox="1"/>
+              <p:nvPr/>
+            </p:nvSpPr>
+            <p:spPr>
+              <a:xfrm>
+                <a:off x="4669812" y="4056699"/>
+                <a:ext cx="1184413" cy="369332"/>
+              </a:xfrm>
+              <a:prstGeom prst="rect">
+                <a:avLst/>
+              </a:prstGeom>
+              <a:noFill/>
+              <a:ln>
+                <a:noFill/>
+              </a:ln>
+            </p:spPr>
+            <p:txBody>
+              <a:bodyPr wrap="square" rtlCol="0">
+                <a:spAutoFit/>
+              </a:bodyPr>
+              <a:lstStyle/>
+              <a:p>
+                <a:r>
+                  <a:rPr lang="en-US" altLang="ja-JP" dirty="0" err="1" smtClean="0">
+                    <a:latin typeface="メイリオ"/>
+                    <a:ea typeface="メイリオ"/>
+                    <a:cs typeface="メイリオ"/>
+                  </a:rPr>
+                  <a:t>xxxxx</a:t>
+                </a:r>
+                <a:r>
+                  <a:rPr lang="en-US" altLang="ja-JP" dirty="0">
+                    <a:latin typeface="メイリオ"/>
+                    <a:ea typeface="メイリオ"/>
+                    <a:cs typeface="メイリオ"/>
+                  </a:rPr>
+                  <a:t> </a:t>
+                </a:r>
+                <a:r>
+                  <a:rPr lang="ja-JP" altLang="en-US" dirty="0" smtClean="0">
+                    <a:latin typeface="メイリオ"/>
+                    <a:ea typeface="メイリオ"/>
+                    <a:cs typeface="メイリオ"/>
+                  </a:rPr>
+                  <a:t>円</a:t>
+                </a:r>
+                <a:endParaRPr kumimoji="1" lang="ja-JP" altLang="en-US" dirty="0">
+                  <a:latin typeface="メイリオ"/>
+                  <a:ea typeface="メイリオ"/>
+                  <a:cs typeface="メイリオ"/>
+                </a:endParaRPr>
+              </a:p>
+            </p:txBody>
+          </p:sp>
+        </p:grpSp>
+        <p:sp>
+          <p:nvSpPr>
+            <p:cNvPr id="7" name="二等辺三角形 6"/>
+            <p:cNvSpPr/>
+            <p:nvPr/>
+          </p:nvSpPr>
+          <p:spPr>
+            <a:xfrm rot="10800000">
+              <a:off x="5590680" y="2436092"/>
+              <a:ext cx="182047" cy="156059"/>
+            </a:xfrm>
+            <a:prstGeom prst="triangle">
+              <a:avLst/>
+            </a:prstGeom>
+            <a:solidFill>
+              <a:schemeClr val="tx1"/>
+            </a:solidFill>
+            <a:ln>
+              <a:solidFill>
+                <a:schemeClr val="tx1"/>
+              </a:solidFill>
+            </a:ln>
+            <a:effectLst/>
+          </p:spPr>
+          <p:style>
+            <a:lnRef idx="1">
+              <a:schemeClr val="accent1"/>
+            </a:lnRef>
+            <a:fillRef idx="3">
+              <a:schemeClr val="accent1"/>
+            </a:fillRef>
+            <a:effectRef idx="2">
+              <a:schemeClr val="accent1"/>
+            </a:effectRef>
+            <a:fontRef idx="minor">
+              <a:schemeClr val="lt1"/>
+            </a:fontRef>
+          </p:style>
+          <p:txBody>
+            <a:bodyPr rtlCol="0" anchor="ctr"/>
+            <a:lstStyle/>
+            <a:p>
+              <a:pPr algn="ctr"/>
+              <a:endParaRPr kumimoji="1" lang="ja-JP" altLang="en-US"/>
+            </a:p>
+          </p:txBody>
+        </p:sp>
+        <p:sp>
+          <p:nvSpPr>
+            <p:cNvPr id="37" name="正方形/長方形 36"/>
+            <p:cNvSpPr/>
+            <p:nvPr/>
+          </p:nvSpPr>
+          <p:spPr>
+            <a:xfrm>
+              <a:off x="3041515" y="1804033"/>
+              <a:ext cx="2812710" cy="3518421"/>
+            </a:xfrm>
+            <a:prstGeom prst="rect">
+              <a:avLst/>
+            </a:prstGeom>
+            <a:solidFill>
+              <a:schemeClr val="bg1"/>
+            </a:solidFill>
+            <a:ln w="25400">
+              <a:solidFill>
+                <a:schemeClr val="tx1"/>
+              </a:solidFill>
+            </a:ln>
+            <a:effectLst/>
+          </p:spPr>
+          <p:style>
+            <a:lnRef idx="1">
+              <a:schemeClr val="accent1"/>
+            </a:lnRef>
+            <a:fillRef idx="3">
+              <a:schemeClr val="accent1"/>
+            </a:fillRef>
+            <a:effectRef idx="2">
+              <a:schemeClr val="accent1"/>
+            </a:effectRef>
+            <a:fontRef idx="minor">
+              <a:schemeClr val="lt1"/>
+            </a:fontRef>
+          </p:style>
+          <p:txBody>
+            <a:bodyPr rtlCol="0" anchor="ctr"/>
+            <a:lstStyle/>
+            <a:p>
+              <a:pPr algn="ctr"/>
+              <a:endParaRPr kumimoji="1" lang="ja-JP" altLang="en-US">
+                <a:solidFill>
+                  <a:schemeClr val="tx1"/>
+                </a:solidFill>
+              </a:endParaRPr>
+            </a:p>
+          </p:txBody>
+        </p:sp>
+        <p:sp>
+          <p:nvSpPr>
+            <p:cNvPr id="38" name="テキスト ボックス 37"/>
+            <p:cNvSpPr txBox="1"/>
+            <p:nvPr/>
+          </p:nvSpPr>
+          <p:spPr>
+            <a:xfrm>
+              <a:off x="3141990" y="1900429"/>
+              <a:ext cx="1620957" cy="338554"/>
+            </a:xfrm>
+            <a:prstGeom prst="rect">
+              <a:avLst/>
+            </a:prstGeom>
+            <a:noFill/>
+          </p:spPr>
+          <p:txBody>
+            <a:bodyPr wrap="none" rtlCol="0">
+              <a:spAutoFit/>
+            </a:bodyPr>
+            <a:lstStyle/>
+            <a:p>
+              <a:r>
+                <a:rPr lang="ja-JP" altLang="en-US" sz="1600" dirty="0" smtClean="0">
+                  <a:latin typeface="メイリオ"/>
+                  <a:ea typeface="メイリオ"/>
+                  <a:cs typeface="メイリオ"/>
+                </a:rPr>
+                <a:t>カテゴリを選択</a:t>
+              </a:r>
+              <a:endParaRPr kumimoji="1" lang="ja-JP" altLang="en-US" sz="1600" dirty="0">
                 <a:latin typeface="メイリオ"/>
                 <a:ea typeface="メイリオ"/>
                 <a:cs typeface="メイリオ"/>
-              </a:rPr>
-              <a:t>アプリ起動時の</a:t>
-            </a:r>
-            <a:r>
-              <a:rPr lang="en-US" altLang="en-US" sz="1400" dirty="0" smtClean="0">
+              </a:endParaRPr>
+            </a:p>
+          </p:txBody>
+        </p:sp>
+        <p:sp>
+          <p:nvSpPr>
+            <p:cNvPr id="40" name="角丸四角形 39"/>
+            <p:cNvSpPr/>
+            <p:nvPr/>
+          </p:nvSpPr>
+          <p:spPr>
+            <a:xfrm>
+              <a:off x="3136624" y="4961507"/>
+              <a:ext cx="1243263" cy="280129"/>
+            </a:xfrm>
+            <a:prstGeom prst="roundRect">
+              <a:avLst/>
+            </a:prstGeom>
+            <a:noFill/>
+            <a:ln w="25400">
+              <a:solidFill>
+                <a:schemeClr val="tx1"/>
+              </a:solidFill>
+            </a:ln>
+            <a:effectLst/>
+          </p:spPr>
+          <p:style>
+            <a:lnRef idx="1">
+              <a:schemeClr val="accent1"/>
+            </a:lnRef>
+            <a:fillRef idx="3">
+              <a:schemeClr val="accent1"/>
+            </a:fillRef>
+            <a:effectRef idx="2">
+              <a:schemeClr val="accent1"/>
+            </a:effectRef>
+            <a:fontRef idx="minor">
+              <a:schemeClr val="lt1"/>
+            </a:fontRef>
+          </p:style>
+          <p:txBody>
+            <a:bodyPr rtlCol="0" anchor="ctr"/>
+            <a:lstStyle/>
+            <a:p>
+              <a:pPr algn="ctr"/>
+              <a:r>
+                <a:rPr lang="en-US" altLang="ja-JP" sz="1400" dirty="0" smtClean="0">
+                  <a:solidFill>
+                    <a:schemeClr val="tx1"/>
+                  </a:solidFill>
+                  <a:latin typeface="メイリオ"/>
+                  <a:ea typeface="メイリオ"/>
+                  <a:cs typeface="メイリオ"/>
+                </a:rPr>
+                <a:t>OK</a:t>
+              </a:r>
+              <a:endParaRPr lang="en-US" altLang="ja-JP" sz="1400" dirty="0" smtClean="0">
+                <a:solidFill>
+                  <a:schemeClr val="tx1"/>
+                </a:solidFill>
                 <a:latin typeface="メイリオ"/>
                 <a:ea typeface="メイリオ"/>
                 <a:cs typeface="メイリオ"/>
-              </a:rPr>
-              <a:t>日付が</a:t>
-            </a:r>
-          </a:p>
-          <a:p>
-            <a:r>
-              <a:rPr lang="ja-JP" altLang="en-US" sz="1400" dirty="0" smtClean="0">
+              </a:endParaRPr>
+            </a:p>
+          </p:txBody>
+        </p:sp>
+        <p:sp>
+          <p:nvSpPr>
+            <p:cNvPr id="41" name="角丸四角形 40"/>
+            <p:cNvSpPr/>
+            <p:nvPr/>
+          </p:nvSpPr>
+          <p:spPr>
+            <a:xfrm>
+              <a:off x="4529464" y="4961507"/>
+              <a:ext cx="1243263" cy="280129"/>
+            </a:xfrm>
+            <a:prstGeom prst="roundRect">
+              <a:avLst/>
+            </a:prstGeom>
+            <a:noFill/>
+            <a:ln w="25400">
+              <a:solidFill>
+                <a:schemeClr val="tx1"/>
+              </a:solidFill>
+            </a:ln>
+            <a:effectLst/>
+          </p:spPr>
+          <p:style>
+            <a:lnRef idx="1">
+              <a:schemeClr val="accent1"/>
+            </a:lnRef>
+            <a:fillRef idx="3">
+              <a:schemeClr val="accent1"/>
+            </a:fillRef>
+            <a:effectRef idx="2">
+              <a:schemeClr val="accent1"/>
+            </a:effectRef>
+            <a:fontRef idx="minor">
+              <a:schemeClr val="lt1"/>
+            </a:fontRef>
+          </p:style>
+          <p:txBody>
+            <a:bodyPr rtlCol="0" anchor="ctr"/>
+            <a:lstStyle/>
+            <a:p>
+              <a:pPr algn="ctr"/>
+              <a:r>
+                <a:rPr lang="ja-JP" altLang="en-US" sz="1400" dirty="0" smtClean="0">
+                  <a:solidFill>
+                    <a:schemeClr val="tx1"/>
+                  </a:solidFill>
+                  <a:latin typeface="メイリオ"/>
+                  <a:ea typeface="メイリオ"/>
+                  <a:cs typeface="メイリオ"/>
+                </a:rPr>
+                <a:t>キャンセル</a:t>
+              </a:r>
+              <a:endParaRPr lang="en-US" altLang="ja-JP" sz="1400" dirty="0" smtClean="0">
+                <a:solidFill>
+                  <a:schemeClr val="tx1"/>
+                </a:solidFill>
                 <a:latin typeface="メイリオ"/>
                 <a:ea typeface="メイリオ"/>
                 <a:cs typeface="メイリオ"/>
-              </a:rPr>
-              <a:t>入力されている</a:t>
-            </a:r>
-            <a:endParaRPr lang="en-US" altLang="ja-JP" sz="1400" dirty="0" smtClean="0">
-              <a:latin typeface="メイリオ"/>
-              <a:ea typeface="メイリオ"/>
-              <a:cs typeface="メイリオ"/>
-            </a:endParaRPr>
-          </a:p>
-        </p:txBody>
-      </p:sp>
+              </a:endParaRPr>
+            </a:p>
+          </p:txBody>
+        </p:sp>
+        <p:cxnSp>
+          <p:nvCxnSpPr>
+            <p:cNvPr id="9" name="直線コネクタ 8"/>
+            <p:cNvCxnSpPr/>
+            <p:nvPr/>
+          </p:nvCxnSpPr>
+          <p:spPr>
+            <a:xfrm>
+              <a:off x="3057830" y="3612762"/>
+              <a:ext cx="2796395" cy="0"/>
+            </a:xfrm>
+            <a:prstGeom prst="line">
+              <a:avLst/>
+            </a:prstGeom>
+            <a:ln w="12700">
+              <a:solidFill>
+                <a:schemeClr val="tx1"/>
+              </a:solidFill>
+            </a:ln>
+            <a:effectLst/>
+          </p:spPr>
+          <p:style>
+            <a:lnRef idx="2">
+              <a:schemeClr val="accent1"/>
+            </a:lnRef>
+            <a:fillRef idx="0">
+              <a:schemeClr val="accent1"/>
+            </a:fillRef>
+            <a:effectRef idx="1">
+              <a:schemeClr val="accent1"/>
+            </a:effectRef>
+            <a:fontRef idx="minor">
+              <a:schemeClr val="tx1"/>
+            </a:fontRef>
+          </p:style>
+        </p:cxnSp>
+        <p:cxnSp>
+          <p:nvCxnSpPr>
+            <p:cNvPr id="42" name="直線コネクタ 41"/>
+            <p:cNvCxnSpPr/>
+            <p:nvPr/>
+          </p:nvCxnSpPr>
+          <p:spPr>
+            <a:xfrm flipV="1">
+              <a:off x="3046285" y="2976733"/>
+              <a:ext cx="2796395" cy="11166"/>
+            </a:xfrm>
+            <a:prstGeom prst="line">
+              <a:avLst/>
+            </a:prstGeom>
+            <a:ln w="12700">
+              <a:solidFill>
+                <a:schemeClr val="tx1"/>
+              </a:solidFill>
+            </a:ln>
+            <a:effectLst/>
+          </p:spPr>
+          <p:style>
+            <a:lnRef idx="2">
+              <a:schemeClr val="accent1"/>
+            </a:lnRef>
+            <a:fillRef idx="0">
+              <a:schemeClr val="accent1"/>
+            </a:fillRef>
+            <a:effectRef idx="1">
+              <a:schemeClr val="accent1"/>
+            </a:effectRef>
+            <a:fontRef idx="minor">
+              <a:schemeClr val="tx1"/>
+            </a:fontRef>
+          </p:style>
+        </p:cxnSp>
+        <p:cxnSp>
+          <p:nvCxnSpPr>
+            <p:cNvPr id="43" name="直線コネクタ 42"/>
+            <p:cNvCxnSpPr/>
+            <p:nvPr/>
+          </p:nvCxnSpPr>
+          <p:spPr>
+            <a:xfrm flipV="1">
+              <a:off x="3062504" y="4237498"/>
+              <a:ext cx="2796395" cy="11166"/>
+            </a:xfrm>
+            <a:prstGeom prst="line">
+              <a:avLst/>
+            </a:prstGeom>
+            <a:ln w="12700">
+              <a:solidFill>
+                <a:schemeClr val="tx1"/>
+              </a:solidFill>
+            </a:ln>
+            <a:effectLst/>
+          </p:spPr>
+          <p:style>
+            <a:lnRef idx="2">
+              <a:schemeClr val="accent1"/>
+            </a:lnRef>
+            <a:fillRef idx="0">
+              <a:schemeClr val="accent1"/>
+            </a:fillRef>
+            <a:effectRef idx="1">
+              <a:schemeClr val="accent1"/>
+            </a:effectRef>
+            <a:fontRef idx="minor">
+              <a:schemeClr val="tx1"/>
+            </a:fontRef>
+          </p:style>
+        </p:cxnSp>
+        <p:cxnSp>
+          <p:nvCxnSpPr>
+            <p:cNvPr id="45" name="直線コネクタ 44"/>
+            <p:cNvCxnSpPr/>
+            <p:nvPr/>
+          </p:nvCxnSpPr>
+          <p:spPr>
+            <a:xfrm flipV="1">
+              <a:off x="3057830" y="2378681"/>
+              <a:ext cx="2796395" cy="11166"/>
+            </a:xfrm>
+            <a:prstGeom prst="line">
+              <a:avLst/>
+            </a:prstGeom>
+            <a:ln w="12700">
+              <a:solidFill>
+                <a:schemeClr val="tx1"/>
+              </a:solidFill>
+            </a:ln>
+            <a:effectLst/>
+          </p:spPr>
+          <p:style>
+            <a:lnRef idx="2">
+              <a:schemeClr val="accent1"/>
+            </a:lnRef>
+            <a:fillRef idx="0">
+              <a:schemeClr val="accent1"/>
+            </a:fillRef>
+            <a:effectRef idx="1">
+              <a:schemeClr val="accent1"/>
+            </a:effectRef>
+            <a:fontRef idx="minor">
+              <a:schemeClr val="tx1"/>
+            </a:fontRef>
+          </p:style>
+        </p:cxnSp>
+        <p:cxnSp>
+          <p:nvCxnSpPr>
+            <p:cNvPr id="46" name="直線コネクタ 45"/>
+            <p:cNvCxnSpPr/>
+            <p:nvPr/>
+          </p:nvCxnSpPr>
+          <p:spPr>
+            <a:xfrm>
+              <a:off x="3046285" y="4885973"/>
+              <a:ext cx="2812614" cy="0"/>
+            </a:xfrm>
+            <a:prstGeom prst="line">
+              <a:avLst/>
+            </a:prstGeom>
+            <a:ln w="12700">
+              <a:solidFill>
+                <a:schemeClr val="tx1"/>
+              </a:solidFill>
+            </a:ln>
+            <a:effectLst/>
+          </p:spPr>
+          <p:style>
+            <a:lnRef idx="2">
+              <a:schemeClr val="accent1"/>
+            </a:lnRef>
+            <a:fillRef idx="0">
+              <a:schemeClr val="accent1"/>
+            </a:fillRef>
+            <a:effectRef idx="1">
+              <a:schemeClr val="accent1"/>
+            </a:effectRef>
+            <a:fontRef idx="minor">
+              <a:schemeClr val="tx1"/>
+            </a:fontRef>
+          </p:style>
+        </p:cxnSp>
+        <p:sp>
+          <p:nvSpPr>
+            <p:cNvPr id="48" name="角丸四角形 47"/>
+            <p:cNvSpPr/>
+            <p:nvPr/>
+          </p:nvSpPr>
+          <p:spPr>
+            <a:xfrm>
+              <a:off x="5471087" y="2592152"/>
+              <a:ext cx="180000" cy="180000"/>
+            </a:xfrm>
+            <a:prstGeom prst="roundRect">
+              <a:avLst/>
+            </a:prstGeom>
+            <a:solidFill>
+              <a:srgbClr val="008000"/>
+            </a:solidFill>
+            <a:ln w="25400">
+              <a:solidFill>
+                <a:schemeClr val="tx1"/>
+              </a:solidFill>
+            </a:ln>
+            <a:effectLst/>
+          </p:spPr>
+          <p:style>
+            <a:lnRef idx="1">
+              <a:schemeClr val="accent1"/>
+            </a:lnRef>
+            <a:fillRef idx="3">
+              <a:schemeClr val="accent1"/>
+            </a:fillRef>
+            <a:effectRef idx="2">
+              <a:schemeClr val="accent1"/>
+            </a:effectRef>
+            <a:fontRef idx="minor">
+              <a:schemeClr val="lt1"/>
+            </a:fontRef>
+          </p:style>
+          <p:txBody>
+            <a:bodyPr rtlCol="0" anchor="ctr"/>
+            <a:lstStyle/>
+            <a:p>
+              <a:pPr algn="ctr"/>
+              <a:endParaRPr lang="en-US" altLang="ja-JP" sz="1400" dirty="0" smtClean="0">
+                <a:solidFill>
+                  <a:schemeClr val="tx1"/>
+                </a:solidFill>
+                <a:latin typeface="メイリオ"/>
+                <a:ea typeface="メイリオ"/>
+                <a:cs typeface="メイリオ"/>
+              </a:endParaRPr>
+            </a:p>
+          </p:txBody>
+        </p:sp>
+        <p:sp>
+          <p:nvSpPr>
+            <p:cNvPr id="49" name="角丸四角形 48"/>
+            <p:cNvSpPr/>
+            <p:nvPr/>
+          </p:nvSpPr>
+          <p:spPr>
+            <a:xfrm>
+              <a:off x="5471087" y="3190783"/>
+              <a:ext cx="180000" cy="180000"/>
+            </a:xfrm>
+            <a:prstGeom prst="roundRect">
+              <a:avLst/>
+            </a:prstGeom>
+            <a:noFill/>
+            <a:ln w="25400">
+              <a:solidFill>
+                <a:schemeClr val="tx1"/>
+              </a:solidFill>
+            </a:ln>
+            <a:effectLst/>
+          </p:spPr>
+          <p:style>
+            <a:lnRef idx="1">
+              <a:schemeClr val="accent1"/>
+            </a:lnRef>
+            <a:fillRef idx="3">
+              <a:schemeClr val="accent1"/>
+            </a:fillRef>
+            <a:effectRef idx="2">
+              <a:schemeClr val="accent1"/>
+            </a:effectRef>
+            <a:fontRef idx="minor">
+              <a:schemeClr val="lt1"/>
+            </a:fontRef>
+          </p:style>
+          <p:txBody>
+            <a:bodyPr rtlCol="0" anchor="ctr"/>
+            <a:lstStyle/>
+            <a:p>
+              <a:pPr algn="ctr"/>
+              <a:endParaRPr lang="en-US" altLang="ja-JP" sz="1400" dirty="0" smtClean="0">
+                <a:solidFill>
+                  <a:schemeClr val="tx1"/>
+                </a:solidFill>
+                <a:latin typeface="メイリオ"/>
+                <a:ea typeface="メイリオ"/>
+                <a:cs typeface="メイリオ"/>
+              </a:endParaRPr>
+            </a:p>
+          </p:txBody>
+        </p:sp>
+        <p:sp>
+          <p:nvSpPr>
+            <p:cNvPr id="50" name="角丸四角形 49"/>
+            <p:cNvSpPr/>
+            <p:nvPr/>
+          </p:nvSpPr>
+          <p:spPr>
+            <a:xfrm>
+              <a:off x="5471087" y="3832879"/>
+              <a:ext cx="180000" cy="180000"/>
+            </a:xfrm>
+            <a:prstGeom prst="roundRect">
+              <a:avLst/>
+            </a:prstGeom>
+            <a:noFill/>
+            <a:ln w="25400">
+              <a:solidFill>
+                <a:schemeClr val="tx1"/>
+              </a:solidFill>
+            </a:ln>
+            <a:effectLst/>
+          </p:spPr>
+          <p:style>
+            <a:lnRef idx="1">
+              <a:schemeClr val="accent1"/>
+            </a:lnRef>
+            <a:fillRef idx="3">
+              <a:schemeClr val="accent1"/>
+            </a:fillRef>
+            <a:effectRef idx="2">
+              <a:schemeClr val="accent1"/>
+            </a:effectRef>
+            <a:fontRef idx="minor">
+              <a:schemeClr val="lt1"/>
+            </a:fontRef>
+          </p:style>
+          <p:txBody>
+            <a:bodyPr rtlCol="0" anchor="ctr"/>
+            <a:lstStyle/>
+            <a:p>
+              <a:pPr algn="ctr"/>
+              <a:endParaRPr lang="en-US" altLang="ja-JP" sz="1400" dirty="0" smtClean="0">
+                <a:solidFill>
+                  <a:schemeClr val="tx1"/>
+                </a:solidFill>
+                <a:latin typeface="メイリオ"/>
+                <a:ea typeface="メイリオ"/>
+                <a:cs typeface="メイリオ"/>
+              </a:endParaRPr>
+            </a:p>
+          </p:txBody>
+        </p:sp>
+        <p:sp>
+          <p:nvSpPr>
+            <p:cNvPr id="51" name="角丸四角形 50"/>
+            <p:cNvSpPr/>
+            <p:nvPr/>
+          </p:nvSpPr>
+          <p:spPr>
+            <a:xfrm>
+              <a:off x="5471087" y="4460666"/>
+              <a:ext cx="180000" cy="180000"/>
+            </a:xfrm>
+            <a:prstGeom prst="roundRect">
+              <a:avLst/>
+            </a:prstGeom>
+            <a:solidFill>
+              <a:srgbClr val="008000"/>
+            </a:solidFill>
+            <a:ln w="25400">
+              <a:solidFill>
+                <a:schemeClr val="tx1"/>
+              </a:solidFill>
+            </a:ln>
+            <a:effectLst/>
+          </p:spPr>
+          <p:style>
+            <a:lnRef idx="1">
+              <a:schemeClr val="accent1"/>
+            </a:lnRef>
+            <a:fillRef idx="3">
+              <a:schemeClr val="accent1"/>
+            </a:fillRef>
+            <a:effectRef idx="2">
+              <a:schemeClr val="accent1"/>
+            </a:effectRef>
+            <a:fontRef idx="minor">
+              <a:schemeClr val="lt1"/>
+            </a:fontRef>
+          </p:style>
+          <p:txBody>
+            <a:bodyPr rtlCol="0" anchor="ctr"/>
+            <a:lstStyle/>
+            <a:p>
+              <a:pPr algn="ctr"/>
+              <a:endParaRPr lang="en-US" altLang="ja-JP" sz="1400" dirty="0" smtClean="0">
+                <a:solidFill>
+                  <a:schemeClr val="tx1"/>
+                </a:solidFill>
+                <a:latin typeface="メイリオ"/>
+                <a:ea typeface="メイリオ"/>
+                <a:cs typeface="メイリオ"/>
+              </a:endParaRPr>
+            </a:p>
+          </p:txBody>
+        </p:sp>
+        <p:sp>
+          <p:nvSpPr>
+            <p:cNvPr id="52" name="テキスト ボックス 51"/>
+            <p:cNvSpPr txBox="1"/>
+            <p:nvPr/>
+          </p:nvSpPr>
+          <p:spPr>
+            <a:xfrm>
+              <a:off x="3141990" y="2512464"/>
+              <a:ext cx="595035" cy="338554"/>
+            </a:xfrm>
+            <a:prstGeom prst="rect">
+              <a:avLst/>
+            </a:prstGeom>
+            <a:noFill/>
+          </p:spPr>
+          <p:txBody>
+            <a:bodyPr wrap="none" rtlCol="0">
+              <a:spAutoFit/>
+            </a:bodyPr>
+            <a:lstStyle/>
+            <a:p>
+              <a:r>
+                <a:rPr kumimoji="1" lang="ja-JP" altLang="en-US" sz="1600" dirty="0" smtClean="0">
+                  <a:latin typeface="メイリオ"/>
+                  <a:ea typeface="メイリオ"/>
+                  <a:cs typeface="メイリオ"/>
+                </a:rPr>
+                <a:t>食費</a:t>
+              </a:r>
+              <a:endParaRPr kumimoji="1" lang="ja-JP" altLang="en-US" sz="1600" dirty="0">
+                <a:latin typeface="メイリオ"/>
+                <a:ea typeface="メイリオ"/>
+                <a:cs typeface="メイリオ"/>
+              </a:endParaRPr>
+            </a:p>
+          </p:txBody>
+        </p:sp>
+        <p:sp>
+          <p:nvSpPr>
+            <p:cNvPr id="53" name="テキスト ボックス 52"/>
+            <p:cNvSpPr txBox="1"/>
+            <p:nvPr/>
+          </p:nvSpPr>
+          <p:spPr>
+            <a:xfrm>
+              <a:off x="3144467" y="3126486"/>
+              <a:ext cx="1210588" cy="338554"/>
+            </a:xfrm>
+            <a:prstGeom prst="rect">
+              <a:avLst/>
+            </a:prstGeom>
+            <a:noFill/>
+          </p:spPr>
+          <p:txBody>
+            <a:bodyPr wrap="none" rtlCol="0">
+              <a:spAutoFit/>
+            </a:bodyPr>
+            <a:lstStyle/>
+            <a:p>
+              <a:r>
+                <a:rPr lang="ja-JP" altLang="en-US" sz="1600" dirty="0" smtClean="0">
+                  <a:latin typeface="メイリオ"/>
+                  <a:ea typeface="メイリオ"/>
+                  <a:cs typeface="メイリオ"/>
+                </a:rPr>
+                <a:t>水道光熱費</a:t>
+              </a:r>
+              <a:endParaRPr kumimoji="1" lang="ja-JP" altLang="en-US" sz="1600" dirty="0">
+                <a:latin typeface="メイリオ"/>
+                <a:ea typeface="メイリオ"/>
+                <a:cs typeface="メイリオ"/>
+              </a:endParaRPr>
+            </a:p>
+          </p:txBody>
+        </p:sp>
+        <p:sp>
+          <p:nvSpPr>
+            <p:cNvPr id="54" name="テキスト ボックス 53"/>
+            <p:cNvSpPr txBox="1"/>
+            <p:nvPr/>
+          </p:nvSpPr>
+          <p:spPr>
+            <a:xfrm>
+              <a:off x="3136624" y="3750695"/>
+              <a:ext cx="800219" cy="338554"/>
+            </a:xfrm>
+            <a:prstGeom prst="rect">
+              <a:avLst/>
+            </a:prstGeom>
+            <a:noFill/>
+          </p:spPr>
+          <p:txBody>
+            <a:bodyPr wrap="none" rtlCol="0">
+              <a:spAutoFit/>
+            </a:bodyPr>
+            <a:lstStyle/>
+            <a:p>
+              <a:r>
+                <a:rPr lang="ja-JP" altLang="en-US" sz="1600" dirty="0" smtClean="0">
+                  <a:latin typeface="メイリオ"/>
+                  <a:ea typeface="メイリオ"/>
+                  <a:cs typeface="メイリオ"/>
+                </a:rPr>
+                <a:t>交通費</a:t>
+              </a:r>
+              <a:endParaRPr kumimoji="1" lang="ja-JP" altLang="en-US" sz="1600" dirty="0">
+                <a:latin typeface="メイリオ"/>
+                <a:ea typeface="メイリオ"/>
+                <a:cs typeface="メイリオ"/>
+              </a:endParaRPr>
+            </a:p>
+          </p:txBody>
+        </p:sp>
+        <p:sp>
+          <p:nvSpPr>
+            <p:cNvPr id="55" name="テキスト ボックス 54"/>
+            <p:cNvSpPr txBox="1"/>
+            <p:nvPr/>
+          </p:nvSpPr>
+          <p:spPr>
+            <a:xfrm>
+              <a:off x="3136624" y="4402941"/>
+              <a:ext cx="800219" cy="338554"/>
+            </a:xfrm>
+            <a:prstGeom prst="rect">
+              <a:avLst/>
+            </a:prstGeom>
+            <a:noFill/>
+          </p:spPr>
+          <p:txBody>
+            <a:bodyPr wrap="none" rtlCol="0">
+              <a:spAutoFit/>
+            </a:bodyPr>
+            <a:lstStyle/>
+            <a:p>
+              <a:r>
+                <a:rPr lang="ja-JP" altLang="en-US" sz="1600" dirty="0" smtClean="0">
+                  <a:latin typeface="メイリオ"/>
+                  <a:ea typeface="メイリオ"/>
+                  <a:cs typeface="メイリオ"/>
+                </a:rPr>
+                <a:t>美容</a:t>
+              </a:r>
+              <a:r>
+                <a:rPr lang="ja-JP" altLang="en-US" sz="1600" dirty="0" smtClean="0">
+                  <a:latin typeface="メイリオ"/>
+                  <a:ea typeface="メイリオ"/>
+                  <a:cs typeface="メイリオ"/>
+                </a:rPr>
+                <a:t>費</a:t>
+              </a:r>
+              <a:endParaRPr kumimoji="1" lang="ja-JP" altLang="en-US" sz="1600" dirty="0">
+                <a:latin typeface="メイリオ"/>
+                <a:ea typeface="メイリオ"/>
+                <a:cs typeface="メイリオ"/>
+              </a:endParaRPr>
+            </a:p>
+          </p:txBody>
+        </p:sp>
+      </p:grpSp>
+      <p:grpSp>
+        <p:nvGrpSpPr>
+          <p:cNvPr id="56" name="図形グループ 55"/>
+          <p:cNvGrpSpPr/>
+          <p:nvPr/>
+        </p:nvGrpSpPr>
+        <p:grpSpPr>
+          <a:xfrm>
+            <a:off x="5865087" y="2968992"/>
+            <a:ext cx="1662549" cy="643770"/>
+            <a:chOff x="5443408" y="1665279"/>
+            <a:chExt cx="1662549" cy="643770"/>
+          </a:xfrm>
+        </p:grpSpPr>
+        <p:sp>
+          <p:nvSpPr>
+            <p:cNvPr id="57" name="円形吹き出し 56"/>
+            <p:cNvSpPr/>
+            <p:nvPr/>
+          </p:nvSpPr>
+          <p:spPr>
+            <a:xfrm>
+              <a:off x="5443408" y="1665279"/>
+              <a:ext cx="1662549" cy="643770"/>
+            </a:xfrm>
+            <a:prstGeom prst="wedgeEllipseCallout">
+              <a:avLst>
+                <a:gd name="adj1" fmla="val -54143"/>
+                <a:gd name="adj2" fmla="val -66659"/>
+              </a:avLst>
+            </a:prstGeom>
+            <a:solidFill>
+              <a:schemeClr val="bg1"/>
+            </a:solidFill>
+            <a:ln w="19050">
+              <a:solidFill>
+                <a:srgbClr val="008000"/>
+              </a:solidFill>
+            </a:ln>
+          </p:spPr>
+          <p:style>
+            <a:lnRef idx="1">
+              <a:schemeClr val="accent1"/>
+            </a:lnRef>
+            <a:fillRef idx="3">
+              <a:schemeClr val="accent1"/>
+            </a:fillRef>
+            <a:effectRef idx="2">
+              <a:schemeClr val="accent1"/>
+            </a:effectRef>
+            <a:fontRef idx="minor">
+              <a:schemeClr val="lt1"/>
+            </a:fontRef>
+          </p:style>
+          <p:txBody>
+            <a:bodyPr rtlCol="0" anchor="ctr"/>
+            <a:lstStyle/>
+            <a:p>
+              <a:pPr algn="ctr"/>
+              <a:endParaRPr kumimoji="1" lang="ja-JP" altLang="en-US" sz="1400" dirty="0">
+                <a:solidFill>
+                  <a:schemeClr val="tx1"/>
+                </a:solidFill>
+                <a:latin typeface="メイリオ"/>
+                <a:ea typeface="メイリオ"/>
+                <a:cs typeface="メイリオ"/>
+              </a:endParaRPr>
+            </a:p>
+          </p:txBody>
+        </p:sp>
+        <p:sp>
+          <p:nvSpPr>
+            <p:cNvPr id="58" name="テキスト ボックス 57"/>
+            <p:cNvSpPr txBox="1"/>
+            <p:nvPr/>
+          </p:nvSpPr>
+          <p:spPr>
+            <a:xfrm>
+              <a:off x="5648428" y="1837660"/>
+              <a:ext cx="1261884" cy="307777"/>
+            </a:xfrm>
+            <a:prstGeom prst="rect">
+              <a:avLst/>
+            </a:prstGeom>
+            <a:noFill/>
+          </p:spPr>
+          <p:txBody>
+            <a:bodyPr wrap="none" rtlCol="0">
+              <a:spAutoFit/>
+            </a:bodyPr>
+            <a:lstStyle/>
+            <a:p>
+              <a:r>
+                <a:rPr lang="ja-JP" altLang="en-US" sz="1400" dirty="0" smtClean="0">
+                  <a:latin typeface="メイリオ"/>
+                  <a:ea typeface="メイリオ"/>
+                  <a:cs typeface="メイリオ"/>
+                </a:rPr>
+                <a:t>複数選択可能</a:t>
+              </a:r>
+              <a:endParaRPr lang="en-US" altLang="en-US" sz="1400" dirty="0" smtClean="0">
+                <a:latin typeface="メイリオ"/>
+                <a:ea typeface="メイリオ"/>
+                <a:cs typeface="メイリオ"/>
+              </a:endParaRPr>
+            </a:p>
+          </p:txBody>
+        </p:sp>
+      </p:grpSp>
     </p:spTree>
     <p:extLst>
       <p:ext uri="{BB962C8B-B14F-4D97-AF65-F5344CB8AC3E}">
-        <p14:creationId xmlns:p14="http://schemas.microsoft.com/office/powerpoint/2010/main" val="1574216287"/>
+        <p14:creationId xmlns:p14="http://schemas.microsoft.com/office/powerpoint/2010/main" val="2863883322"/>
       </p:ext>
     </p:extLst>
   </p:cSld>
@@ -5314,7 +7680,7 @@
 </p:sld>
 </file>
 
-<file path=ppt/slides/slide3.xml><?xml version="1.0" encoding="utf-8"?>
+<file path=ppt/slides/slide4.xml><?xml version="1.0" encoding="utf-8"?>
 <p:sld xmlns:a="http://schemas.openxmlformats.org/drawingml/2006/main" xmlns:r="http://schemas.openxmlformats.org/officeDocument/2006/relationships" xmlns:p="http://schemas.openxmlformats.org/presentationml/2006/main">
   <p:cSld>
     <p:spTree>
@@ -5960,7 +8326,7 @@
               <a:avLst/>
             </a:prstGeom>
             <a:solidFill>
-              <a:schemeClr val="tx1"/>
+              <a:schemeClr val="bg1"/>
             </a:solidFill>
             <a:ln>
               <a:solidFill>
@@ -6290,126 +8656,141 @@
           </p:txBody>
         </p:sp>
       </p:grpSp>
-      <p:sp>
-        <p:nvSpPr>
-          <p:cNvPr id="32" name="円形吹き出し 31"/>
-          <p:cNvSpPr/>
+      <p:grpSp>
+        <p:nvGrpSpPr>
+          <p:cNvPr id="2" name="図形グループ 1"/>
+          <p:cNvGrpSpPr/>
           <p:nvPr/>
-        </p:nvSpPr>
-        <p:spPr>
+        </p:nvGrpSpPr>
+        <p:grpSpPr>
           <a:xfrm>
-            <a:off x="5133990" y="4623225"/>
+            <a:off x="5561155" y="4542410"/>
             <a:ext cx="2409517" cy="872852"/>
+            <a:chOff x="5133990" y="4623225"/>
+            <a:chExt cx="2409517" cy="872852"/>
           </a:xfrm>
-          <a:prstGeom prst="wedgeEllipseCallout">
-            <a:avLst>
-              <a:gd name="adj1" fmla="val -47434"/>
-              <a:gd name="adj2" fmla="val -62691"/>
-            </a:avLst>
-          </a:prstGeom>
-          <a:solidFill>
-            <a:schemeClr val="bg1"/>
-          </a:solidFill>
-          <a:ln w="19050">
+        </p:grpSpPr>
+        <p:sp>
+          <p:nvSpPr>
+            <p:cNvPr id="32" name="円形吹き出し 31"/>
+            <p:cNvSpPr/>
+            <p:nvPr/>
+          </p:nvSpPr>
+          <p:spPr>
+            <a:xfrm>
+              <a:off x="5133990" y="4623225"/>
+              <a:ext cx="2409517" cy="872852"/>
+            </a:xfrm>
+            <a:prstGeom prst="wedgeEllipseCallout">
+              <a:avLst>
+                <a:gd name="adj1" fmla="val -47434"/>
+                <a:gd name="adj2" fmla="val -62691"/>
+              </a:avLst>
+            </a:prstGeom>
             <a:solidFill>
-              <a:srgbClr val="008000"/>
+              <a:schemeClr val="bg1"/>
             </a:solidFill>
-          </a:ln>
-        </p:spPr>
-        <p:style>
-          <a:lnRef idx="1">
-            <a:schemeClr val="accent1"/>
-          </a:lnRef>
-          <a:fillRef idx="3">
-            <a:schemeClr val="accent1"/>
-          </a:fillRef>
-          <a:effectRef idx="2">
-            <a:schemeClr val="accent1"/>
-          </a:effectRef>
-          <a:fontRef idx="minor">
-            <a:schemeClr val="lt1"/>
-          </a:fontRef>
-        </p:style>
-        <p:txBody>
-          <a:bodyPr rtlCol="0" anchor="ctr"/>
-          <a:lstStyle/>
-          <a:p>
-            <a:pPr algn="ctr"/>
-            <a:endParaRPr kumimoji="1" lang="ja-JP" altLang="en-US" sz="1400" dirty="0">
+            <a:ln w="19050">
               <a:solidFill>
-                <a:schemeClr val="tx1"/>
+                <a:srgbClr val="008000"/>
               </a:solidFill>
-              <a:latin typeface="メイリオ"/>
-              <a:ea typeface="メイリオ"/>
-              <a:cs typeface="メイリオ"/>
-            </a:endParaRPr>
-          </a:p>
-        </p:txBody>
-      </p:sp>
-      <p:sp>
-        <p:nvSpPr>
-          <p:cNvPr id="33" name="テキスト ボックス 32"/>
-          <p:cNvSpPr txBox="1"/>
-          <p:nvPr/>
-        </p:nvSpPr>
-        <p:spPr>
-          <a:xfrm>
-            <a:off x="5285980" y="4807152"/>
-            <a:ext cx="2159566" cy="523220"/>
-          </a:xfrm>
-          <a:prstGeom prst="rect">
-            <a:avLst/>
-          </a:prstGeom>
-          <a:noFill/>
-        </p:spPr>
-        <p:txBody>
-          <a:bodyPr wrap="none" rtlCol="0">
-            <a:spAutoFit/>
-          </a:bodyPr>
-          <a:lstStyle/>
-          <a:p>
-            <a:r>
-              <a:rPr lang="ja-JP" altLang="en-US" sz="1400" dirty="0" smtClean="0">
+            </a:ln>
+          </p:spPr>
+          <p:style>
+            <a:lnRef idx="1">
+              <a:schemeClr val="accent1"/>
+            </a:lnRef>
+            <a:fillRef idx="3">
+              <a:schemeClr val="accent1"/>
+            </a:fillRef>
+            <a:effectRef idx="2">
+              <a:schemeClr val="accent1"/>
+            </a:effectRef>
+            <a:fontRef idx="minor">
+              <a:schemeClr val="lt1"/>
+            </a:fontRef>
+          </p:style>
+          <p:txBody>
+            <a:bodyPr rtlCol="0" anchor="ctr"/>
+            <a:lstStyle/>
+            <a:p>
+              <a:pPr algn="ctr"/>
+              <a:endParaRPr kumimoji="1" lang="ja-JP" altLang="en-US" sz="1400" dirty="0">
+                <a:solidFill>
+                  <a:schemeClr val="tx1"/>
+                </a:solidFill>
                 <a:latin typeface="メイリオ"/>
                 <a:ea typeface="メイリオ"/>
                 <a:cs typeface="メイリオ"/>
-              </a:rPr>
-              <a:t>登録した家計簿を含めて</a:t>
-            </a:r>
-            <a:endParaRPr lang="en-US" altLang="ja-JP" sz="1400" dirty="0" smtClean="0">
-              <a:latin typeface="メイリオ"/>
-              <a:ea typeface="メイリオ"/>
-              <a:cs typeface="メイリオ"/>
-            </a:endParaRPr>
-          </a:p>
-          <a:p>
-            <a:r>
-              <a:rPr lang="en-US" altLang="en-US" sz="1400" dirty="0" smtClean="0">
+              </a:endParaRPr>
+            </a:p>
+          </p:txBody>
+        </p:sp>
+        <p:sp>
+          <p:nvSpPr>
+            <p:cNvPr id="33" name="テキスト ボックス 32"/>
+            <p:cNvSpPr txBox="1"/>
+            <p:nvPr/>
+          </p:nvSpPr>
+          <p:spPr>
+            <a:xfrm>
+              <a:off x="5285980" y="4807152"/>
+              <a:ext cx="2159566" cy="523220"/>
+            </a:xfrm>
+            <a:prstGeom prst="rect">
+              <a:avLst/>
+            </a:prstGeom>
+            <a:noFill/>
+          </p:spPr>
+          <p:txBody>
+            <a:bodyPr wrap="none" rtlCol="0">
+              <a:spAutoFit/>
+            </a:bodyPr>
+            <a:lstStyle/>
+            <a:p>
+              <a:r>
+                <a:rPr lang="ja-JP" altLang="en-US" sz="1400" dirty="0" smtClean="0">
+                  <a:latin typeface="メイリオ"/>
+                  <a:ea typeface="メイリオ"/>
+                  <a:cs typeface="メイリオ"/>
+                </a:rPr>
+                <a:t>登録した家計簿を含めて</a:t>
+              </a:r>
+              <a:endParaRPr lang="en-US" altLang="ja-JP" sz="1400" dirty="0" smtClean="0">
                 <a:latin typeface="メイリオ"/>
                 <a:ea typeface="メイリオ"/>
                 <a:cs typeface="メイリオ"/>
-              </a:rPr>
-              <a:t>収支が</a:t>
-            </a:r>
-            <a:r>
-              <a:rPr lang="ja-JP" altLang="en-US" sz="1400" dirty="0" smtClean="0">
-                <a:latin typeface="メイリオ"/>
-                <a:ea typeface="メイリオ"/>
-                <a:cs typeface="メイリオ"/>
-              </a:rPr>
-              <a:t>再計算</a:t>
-            </a:r>
-            <a:r>
-              <a:rPr lang="en-US" altLang="en-US" sz="1400" dirty="0" smtClean="0">
-                <a:latin typeface="メイリオ"/>
-                <a:ea typeface="メイリオ"/>
-                <a:cs typeface="メイリオ"/>
-              </a:rPr>
-              <a:t>される</a:t>
-            </a:r>
-          </a:p>
-        </p:txBody>
-      </p:sp>
+              </a:endParaRPr>
+            </a:p>
+            <a:p>
+              <a:r>
+                <a:rPr lang="en-US" altLang="en-US" sz="1400" dirty="0" smtClean="0">
+                  <a:latin typeface="メイリオ"/>
+                  <a:ea typeface="メイリオ"/>
+                  <a:cs typeface="メイリオ"/>
+                </a:rPr>
+                <a:t>収支が</a:t>
+              </a:r>
+              <a:r>
+                <a:rPr lang="ja-JP" altLang="en-US" sz="1400" dirty="0" smtClean="0">
+                  <a:latin typeface="メイリオ"/>
+                  <a:ea typeface="メイリオ"/>
+                  <a:cs typeface="メイリオ"/>
+                </a:rPr>
+                <a:t>再計算</a:t>
+              </a:r>
+              <a:r>
+                <a:rPr lang="en-US" altLang="en-US" sz="1400" dirty="0" smtClean="0">
+                  <a:latin typeface="メイリオ"/>
+                  <a:ea typeface="メイリオ"/>
+                  <a:cs typeface="メイリオ"/>
+                </a:rPr>
+                <a:t>される</a:t>
+              </a:r>
+            </a:p>
+          </p:txBody>
+        </p:sp>
+      </p:grpSp>
       <p:sp>
         <p:nvSpPr>
           <p:cNvPr id="28" name="円形吹き出し 27"/>
@@ -6522,6 +8903,199 @@
           </a:p>
         </p:txBody>
       </p:sp>
+      <p:sp>
+        <p:nvSpPr>
+          <p:cNvPr id="34" name="正方形/長方形 33"/>
+          <p:cNvSpPr/>
+          <p:nvPr/>
+        </p:nvSpPr>
+        <p:spPr>
+          <a:xfrm>
+            <a:off x="3124452" y="5415262"/>
+            <a:ext cx="2672499" cy="284940"/>
+          </a:xfrm>
+          <a:prstGeom prst="rect">
+            <a:avLst/>
+          </a:prstGeom>
+          <a:solidFill>
+            <a:schemeClr val="bg1">
+              <a:lumMod val="75000"/>
+            </a:schemeClr>
+          </a:solidFill>
+          <a:ln w="25400">
+            <a:solidFill>
+              <a:schemeClr val="bg1">
+                <a:lumMod val="75000"/>
+              </a:schemeClr>
+            </a:solidFill>
+          </a:ln>
+          <a:effectLst/>
+        </p:spPr>
+        <p:style>
+          <a:lnRef idx="1">
+            <a:schemeClr val="accent1"/>
+          </a:lnRef>
+          <a:fillRef idx="3">
+            <a:schemeClr val="accent1"/>
+          </a:fillRef>
+          <a:effectRef idx="2">
+            <a:schemeClr val="accent1"/>
+          </a:effectRef>
+          <a:fontRef idx="minor">
+            <a:schemeClr val="lt1"/>
+          </a:fontRef>
+        </p:style>
+        <p:txBody>
+          <a:bodyPr rtlCol="0" anchor="ctr"/>
+          <a:lstStyle/>
+          <a:p>
+            <a:pPr algn="ctr"/>
+            <a:r>
+              <a:rPr kumimoji="1" lang="ja-JP" altLang="en-US" sz="1400" dirty="0" smtClean="0">
+                <a:solidFill>
+                  <a:schemeClr val="tx1"/>
+                </a:solidFill>
+                <a:latin typeface="メイリオ"/>
+                <a:ea typeface="メイリオ"/>
+                <a:cs typeface="メイリオ"/>
+              </a:rPr>
+              <a:t>収支情報を登録しました</a:t>
+            </a:r>
+            <a:endParaRPr kumimoji="1" lang="ja-JP" altLang="en-US" sz="1400" dirty="0">
+              <a:solidFill>
+                <a:schemeClr val="tx1"/>
+              </a:solidFill>
+              <a:latin typeface="メイリオ"/>
+              <a:ea typeface="メイリオ"/>
+              <a:cs typeface="メイリオ"/>
+            </a:endParaRPr>
+          </a:p>
+        </p:txBody>
+      </p:sp>
+      <p:grpSp>
+        <p:nvGrpSpPr>
+          <p:cNvPr id="35" name="図形グループ 34"/>
+          <p:cNvGrpSpPr/>
+          <p:nvPr/>
+        </p:nvGrpSpPr>
+        <p:grpSpPr>
+          <a:xfrm>
+            <a:off x="702815" y="4405361"/>
+            <a:ext cx="2409517" cy="872852"/>
+            <a:chOff x="5133990" y="4623225"/>
+            <a:chExt cx="2409517" cy="872852"/>
+          </a:xfrm>
+        </p:grpSpPr>
+        <p:sp>
+          <p:nvSpPr>
+            <p:cNvPr id="36" name="円形吹き出し 35"/>
+            <p:cNvSpPr/>
+            <p:nvPr/>
+          </p:nvSpPr>
+          <p:spPr>
+            <a:xfrm>
+              <a:off x="5133990" y="4623225"/>
+              <a:ext cx="2409517" cy="872852"/>
+            </a:xfrm>
+            <a:prstGeom prst="wedgeEllipseCallout">
+              <a:avLst>
+                <a:gd name="adj1" fmla="val 44565"/>
+                <a:gd name="adj2" fmla="val 53709"/>
+              </a:avLst>
+            </a:prstGeom>
+            <a:solidFill>
+              <a:schemeClr val="bg1"/>
+            </a:solidFill>
+            <a:ln w="19050">
+              <a:solidFill>
+                <a:srgbClr val="008000"/>
+              </a:solidFill>
+            </a:ln>
+          </p:spPr>
+          <p:style>
+            <a:lnRef idx="1">
+              <a:schemeClr val="accent1"/>
+            </a:lnRef>
+            <a:fillRef idx="3">
+              <a:schemeClr val="accent1"/>
+            </a:fillRef>
+            <a:effectRef idx="2">
+              <a:schemeClr val="accent1"/>
+            </a:effectRef>
+            <a:fontRef idx="minor">
+              <a:schemeClr val="lt1"/>
+            </a:fontRef>
+          </p:style>
+          <p:txBody>
+            <a:bodyPr rtlCol="0" anchor="ctr"/>
+            <a:lstStyle/>
+            <a:p>
+              <a:pPr algn="ctr"/>
+              <a:endParaRPr kumimoji="1" lang="ja-JP" altLang="en-US" sz="1400" dirty="0">
+                <a:solidFill>
+                  <a:schemeClr val="tx1"/>
+                </a:solidFill>
+                <a:latin typeface="メイリオ"/>
+                <a:ea typeface="メイリオ"/>
+                <a:cs typeface="メイリオ"/>
+              </a:endParaRPr>
+            </a:p>
+          </p:txBody>
+        </p:sp>
+        <p:sp>
+          <p:nvSpPr>
+            <p:cNvPr id="37" name="テキスト ボックス 36"/>
+            <p:cNvSpPr txBox="1"/>
+            <p:nvPr/>
+          </p:nvSpPr>
+          <p:spPr>
+            <a:xfrm>
+              <a:off x="5285980" y="4807152"/>
+              <a:ext cx="2159566" cy="523220"/>
+            </a:xfrm>
+            <a:prstGeom prst="rect">
+              <a:avLst/>
+            </a:prstGeom>
+            <a:noFill/>
+          </p:spPr>
+          <p:txBody>
+            <a:bodyPr wrap="none" rtlCol="0">
+              <a:spAutoFit/>
+            </a:bodyPr>
+            <a:lstStyle/>
+            <a:p>
+              <a:r>
+                <a:rPr lang="ja-JP" altLang="en-US" sz="1400" dirty="0" smtClean="0">
+                  <a:latin typeface="メイリオ"/>
+                  <a:ea typeface="メイリオ"/>
+                  <a:cs typeface="メイリオ"/>
+                </a:rPr>
+                <a:t>登録に成功した場合の</a:t>
+              </a:r>
+              <a:endParaRPr lang="en-US" altLang="ja-JP" sz="1400" dirty="0" smtClean="0">
+                <a:latin typeface="メイリオ"/>
+                <a:ea typeface="メイリオ"/>
+                <a:cs typeface="メイリオ"/>
+              </a:endParaRPr>
+            </a:p>
+            <a:p>
+              <a:r>
+                <a:rPr lang="ja-JP" altLang="en-US" sz="1400" dirty="0" smtClean="0">
+                  <a:latin typeface="メイリオ"/>
+                  <a:ea typeface="メイリオ"/>
+                  <a:cs typeface="メイリオ"/>
+                </a:rPr>
+                <a:t>メッセージが表示される</a:t>
+              </a:r>
+              <a:endParaRPr lang="en-US" altLang="ja-JP" sz="1400" dirty="0" smtClean="0">
+                <a:latin typeface="メイリオ"/>
+                <a:ea typeface="メイリオ"/>
+                <a:cs typeface="メイリオ"/>
+              </a:endParaRPr>
+            </a:p>
+          </p:txBody>
+        </p:sp>
+      </p:grpSp>
     </p:spTree>
     <p:extLst>
       <p:ext uri="{BB962C8B-B14F-4D97-AF65-F5344CB8AC3E}">
@@ -6535,7 +9109,7 @@
 </p:sld>
 </file>
 
-<file path=ppt/slides/slide4.xml><?xml version="1.0" encoding="utf-8"?>
+<file path=ppt/slides/slide5.xml><?xml version="1.0" encoding="utf-8"?>
 <p:sld xmlns:a="http://schemas.openxmlformats.org/drawingml/2006/main" xmlns:r="http://schemas.openxmlformats.org/officeDocument/2006/relationships" xmlns:p="http://schemas.openxmlformats.org/presentationml/2006/main">
   <p:cSld>
     <p:spTree>
@@ -6583,139 +9157,6 @@
               <a:t>登録失敗時</a:t>
             </a:r>
             <a:endParaRPr kumimoji="1" lang="ja-JP" altLang="en-US" sz="2000" dirty="0">
-              <a:latin typeface="メイリオ"/>
-              <a:ea typeface="メイリオ"/>
-              <a:cs typeface="メイリオ"/>
-            </a:endParaRPr>
-          </a:p>
-        </p:txBody>
-      </p:sp>
-      <p:sp>
-        <p:nvSpPr>
-          <p:cNvPr id="6" name="円形吹き出し 5"/>
-          <p:cNvSpPr/>
-          <p:nvPr/>
-        </p:nvSpPr>
-        <p:spPr>
-          <a:xfrm>
-            <a:off x="6207771" y="2338597"/>
-            <a:ext cx="2409517" cy="872852"/>
-          </a:xfrm>
-          <a:prstGeom prst="wedgeEllipseCallout">
-            <a:avLst>
-              <a:gd name="adj1" fmla="val -47434"/>
-              <a:gd name="adj2" fmla="val -62691"/>
-            </a:avLst>
-          </a:prstGeom>
-          <a:solidFill>
-            <a:schemeClr val="bg1"/>
-          </a:solidFill>
-          <a:ln w="19050">
-            <a:solidFill>
-              <a:srgbClr val="008000"/>
-            </a:solidFill>
-          </a:ln>
-        </p:spPr>
-        <p:style>
-          <a:lnRef idx="1">
-            <a:schemeClr val="accent1"/>
-          </a:lnRef>
-          <a:fillRef idx="3">
-            <a:schemeClr val="accent1"/>
-          </a:fillRef>
-          <a:effectRef idx="2">
-            <a:schemeClr val="accent1"/>
-          </a:effectRef>
-          <a:fontRef idx="minor">
-            <a:schemeClr val="lt1"/>
-          </a:fontRef>
-        </p:style>
-        <p:txBody>
-          <a:bodyPr rtlCol="0" anchor="ctr"/>
-          <a:lstStyle/>
-          <a:p>
-            <a:pPr algn="ctr"/>
-            <a:endParaRPr kumimoji="1" lang="ja-JP" altLang="en-US" sz="1400" dirty="0">
-              <a:solidFill>
-                <a:schemeClr val="tx1"/>
-              </a:solidFill>
-              <a:latin typeface="メイリオ"/>
-              <a:ea typeface="メイリオ"/>
-              <a:cs typeface="メイリオ"/>
-            </a:endParaRPr>
-          </a:p>
-        </p:txBody>
-      </p:sp>
-      <p:sp>
-        <p:nvSpPr>
-          <p:cNvPr id="7" name="テキスト ボックス 6"/>
-          <p:cNvSpPr txBox="1"/>
-          <p:nvPr/>
-        </p:nvSpPr>
-        <p:spPr>
-          <a:xfrm>
-            <a:off x="6530474" y="2542170"/>
-            <a:ext cx="1800493" cy="523220"/>
-          </a:xfrm>
-          <a:prstGeom prst="rect">
-            <a:avLst/>
-          </a:prstGeom>
-          <a:noFill/>
-        </p:spPr>
-        <p:txBody>
-          <a:bodyPr wrap="none" rtlCol="0">
-            <a:spAutoFit/>
-          </a:bodyPr>
-          <a:lstStyle/>
-          <a:p>
-            <a:r>
-              <a:rPr lang="ja-JP" altLang="en-US" sz="1400" dirty="0">
-                <a:latin typeface="メイリオ"/>
-                <a:ea typeface="メイリオ"/>
-                <a:cs typeface="メイリオ"/>
-              </a:rPr>
-              <a:t>入力が不正な項目</a:t>
-            </a:r>
-            <a:r>
-              <a:rPr lang="ja-JP" altLang="en-US" sz="1400" dirty="0" smtClean="0">
-                <a:latin typeface="メイリオ"/>
-                <a:ea typeface="メイリオ"/>
-                <a:cs typeface="メイリオ"/>
-              </a:rPr>
-              <a:t>に</a:t>
-            </a:r>
-            <a:endParaRPr lang="en-US" altLang="ja-JP" sz="1400" dirty="0" smtClean="0">
-              <a:latin typeface="メイリオ"/>
-              <a:ea typeface="メイリオ"/>
-              <a:cs typeface="メイリオ"/>
-            </a:endParaRPr>
-          </a:p>
-          <a:p>
-            <a:r>
-              <a:rPr lang="ja-JP" altLang="en-US" sz="1400" dirty="0" smtClean="0">
-                <a:latin typeface="メイリオ"/>
-                <a:ea typeface="メイリオ"/>
-                <a:cs typeface="メイリオ"/>
-              </a:rPr>
-              <a:t>マーク</a:t>
-            </a:r>
-            <a:r>
-              <a:rPr lang="ja-JP" altLang="en-US" sz="1400" dirty="0">
-                <a:latin typeface="メイリオ"/>
-                <a:ea typeface="メイリオ"/>
-                <a:cs typeface="メイリオ"/>
-              </a:rPr>
-              <a:t>が表示</a:t>
-            </a:r>
-            <a:r>
-              <a:rPr lang="ja-JP" altLang="en-US" sz="1400" dirty="0" smtClean="0">
-                <a:latin typeface="メイリオ"/>
-                <a:ea typeface="メイリオ"/>
-                <a:cs typeface="メイリオ"/>
-              </a:rPr>
-              <a:t>される</a:t>
-            </a:r>
-            <a:endParaRPr lang="ja-JP" altLang="en-US" sz="1400" dirty="0">
               <a:latin typeface="メイリオ"/>
               <a:ea typeface="メイリオ"/>
               <a:cs typeface="メイリオ"/>
@@ -7314,7 +9755,7 @@
               <a:avLst/>
             </a:prstGeom>
             <a:solidFill>
-              <a:schemeClr val="tx1"/>
+              <a:schemeClr val="bg1"/>
             </a:solidFill>
             <a:ln>
               <a:solidFill>
@@ -7492,53 +9933,6 @@
           <p:spPr>
             <a:xfrm>
               <a:off x="6029729" y="1400682"/>
-              <a:ext cx="178043" cy="154313"/>
-            </a:xfrm>
-            <a:prstGeom prst="star7">
-              <a:avLst/>
-            </a:prstGeom>
-            <a:solidFill>
-              <a:srgbClr val="FF0000"/>
-            </a:solidFill>
-            <a:ln>
-              <a:solidFill>
-                <a:srgbClr val="FF0000"/>
-              </a:solidFill>
-            </a:ln>
-            <a:effectLst/>
-          </p:spPr>
-          <p:style>
-            <a:lnRef idx="1">
-              <a:schemeClr val="accent1"/>
-            </a:lnRef>
-            <a:fillRef idx="3">
-              <a:schemeClr val="accent1"/>
-            </a:fillRef>
-            <a:effectRef idx="2">
-              <a:schemeClr val="accent1"/>
-            </a:effectRef>
-            <a:fontRef idx="minor">
-              <a:schemeClr val="lt1"/>
-            </a:fontRef>
-          </p:style>
-          <p:txBody>
-            <a:bodyPr rtlCol="0" anchor="ctr"/>
-            <a:lstStyle/>
-            <a:p>
-              <a:pPr algn="ctr"/>
-              <a:endParaRPr kumimoji="1" lang="ja-JP" altLang="en-US"/>
-            </a:p>
-          </p:txBody>
-        </p:sp>
-        <p:sp>
-          <p:nvSpPr>
-            <p:cNvPr id="28" name="星 7 27"/>
-            <p:cNvSpPr/>
-            <p:nvPr/>
-          </p:nvSpPr>
-          <p:spPr>
-            <a:xfrm>
-              <a:off x="6029729" y="1924854"/>
               <a:ext cx="178043" cy="154313"/>
             </a:xfrm>
             <a:prstGeom prst="star7">
@@ -7676,6 +10070,347 @@
                 <a:t>円</a:t>
               </a:r>
               <a:endParaRPr kumimoji="1" lang="ja-JP" altLang="en-US" dirty="0">
+                <a:latin typeface="メイリオ"/>
+                <a:ea typeface="メイリオ"/>
+                <a:cs typeface="メイリオ"/>
+              </a:endParaRPr>
+            </a:p>
+          </p:txBody>
+        </p:sp>
+      </p:grpSp>
+      <p:grpSp>
+        <p:nvGrpSpPr>
+          <p:cNvPr id="8" name="図形グループ 7"/>
+          <p:cNvGrpSpPr/>
+          <p:nvPr/>
+        </p:nvGrpSpPr>
+        <p:grpSpPr>
+          <a:xfrm>
+            <a:off x="6207771" y="1738257"/>
+            <a:ext cx="2409517" cy="872852"/>
+            <a:chOff x="6207771" y="2338597"/>
+            <a:chExt cx="2409517" cy="872852"/>
+          </a:xfrm>
+        </p:grpSpPr>
+        <p:sp>
+          <p:nvSpPr>
+            <p:cNvPr id="6" name="円形吹き出し 5"/>
+            <p:cNvSpPr/>
+            <p:nvPr/>
+          </p:nvSpPr>
+          <p:spPr>
+            <a:xfrm>
+              <a:off x="6207771" y="2338597"/>
+              <a:ext cx="2409517" cy="872852"/>
+            </a:xfrm>
+            <a:prstGeom prst="wedgeEllipseCallout">
+              <a:avLst>
+                <a:gd name="adj1" fmla="val -47434"/>
+                <a:gd name="adj2" fmla="val -62691"/>
+              </a:avLst>
+            </a:prstGeom>
+            <a:solidFill>
+              <a:schemeClr val="bg1"/>
+            </a:solidFill>
+            <a:ln w="19050">
+              <a:solidFill>
+                <a:srgbClr val="008000"/>
+              </a:solidFill>
+            </a:ln>
+          </p:spPr>
+          <p:style>
+            <a:lnRef idx="1">
+              <a:schemeClr val="accent1"/>
+            </a:lnRef>
+            <a:fillRef idx="3">
+              <a:schemeClr val="accent1"/>
+            </a:fillRef>
+            <a:effectRef idx="2">
+              <a:schemeClr val="accent1"/>
+            </a:effectRef>
+            <a:fontRef idx="minor">
+              <a:schemeClr val="lt1"/>
+            </a:fontRef>
+          </p:style>
+          <p:txBody>
+            <a:bodyPr rtlCol="0" anchor="ctr"/>
+            <a:lstStyle/>
+            <a:p>
+              <a:pPr algn="ctr"/>
+              <a:endParaRPr kumimoji="1" lang="ja-JP" altLang="en-US" sz="1400" dirty="0">
+                <a:solidFill>
+                  <a:schemeClr val="tx1"/>
+                </a:solidFill>
+                <a:latin typeface="メイリオ"/>
+                <a:ea typeface="メイリオ"/>
+                <a:cs typeface="メイリオ"/>
+              </a:endParaRPr>
+            </a:p>
+          </p:txBody>
+        </p:sp>
+        <p:sp>
+          <p:nvSpPr>
+            <p:cNvPr id="7" name="テキスト ボックス 6"/>
+            <p:cNvSpPr txBox="1"/>
+            <p:nvPr/>
+          </p:nvSpPr>
+          <p:spPr>
+            <a:xfrm>
+              <a:off x="6530474" y="2542170"/>
+              <a:ext cx="1800493" cy="523220"/>
+            </a:xfrm>
+            <a:prstGeom prst="rect">
+              <a:avLst/>
+            </a:prstGeom>
+            <a:noFill/>
+          </p:spPr>
+          <p:txBody>
+            <a:bodyPr wrap="none" rtlCol="0">
+              <a:spAutoFit/>
+            </a:bodyPr>
+            <a:lstStyle/>
+            <a:p>
+              <a:r>
+                <a:rPr lang="ja-JP" altLang="en-US" sz="1400" dirty="0">
+                  <a:latin typeface="メイリオ"/>
+                  <a:ea typeface="メイリオ"/>
+                  <a:cs typeface="メイリオ"/>
+                </a:rPr>
+                <a:t>入力が不正な項目</a:t>
+              </a:r>
+              <a:r>
+                <a:rPr lang="ja-JP" altLang="en-US" sz="1400" dirty="0" smtClean="0">
+                  <a:latin typeface="メイリオ"/>
+                  <a:ea typeface="メイリオ"/>
+                  <a:cs typeface="メイリオ"/>
+                </a:rPr>
+                <a:t>に</a:t>
+              </a:r>
+              <a:endParaRPr lang="en-US" altLang="ja-JP" sz="1400" dirty="0" smtClean="0">
+                <a:latin typeface="メイリオ"/>
+                <a:ea typeface="メイリオ"/>
+                <a:cs typeface="メイリオ"/>
+              </a:endParaRPr>
+            </a:p>
+            <a:p>
+              <a:r>
+                <a:rPr lang="ja-JP" altLang="en-US" sz="1400" dirty="0" smtClean="0">
+                  <a:latin typeface="メイリオ"/>
+                  <a:ea typeface="メイリオ"/>
+                  <a:cs typeface="メイリオ"/>
+                </a:rPr>
+                <a:t>マーク</a:t>
+              </a:r>
+              <a:r>
+                <a:rPr lang="ja-JP" altLang="en-US" sz="1400" dirty="0">
+                  <a:latin typeface="メイリオ"/>
+                  <a:ea typeface="メイリオ"/>
+                  <a:cs typeface="メイリオ"/>
+                </a:rPr>
+                <a:t>が表示</a:t>
+              </a:r>
+              <a:r>
+                <a:rPr lang="ja-JP" altLang="en-US" sz="1400" dirty="0" smtClean="0">
+                  <a:latin typeface="メイリオ"/>
+                  <a:ea typeface="メイリオ"/>
+                  <a:cs typeface="メイリオ"/>
+                </a:rPr>
+                <a:t>される</a:t>
+              </a:r>
+              <a:endParaRPr lang="ja-JP" altLang="en-US" sz="1400" dirty="0">
+                <a:latin typeface="メイリオ"/>
+                <a:ea typeface="メイリオ"/>
+                <a:cs typeface="メイリオ"/>
+              </a:endParaRPr>
+            </a:p>
+          </p:txBody>
+        </p:sp>
+      </p:grpSp>
+      <p:sp>
+        <p:nvSpPr>
+          <p:cNvPr id="31" name="正方形/長方形 30"/>
+          <p:cNvSpPr/>
+          <p:nvPr/>
+        </p:nvSpPr>
+        <p:spPr>
+          <a:xfrm>
+            <a:off x="3124452" y="5415262"/>
+            <a:ext cx="2672499" cy="284940"/>
+          </a:xfrm>
+          <a:prstGeom prst="rect">
+            <a:avLst/>
+          </a:prstGeom>
+          <a:solidFill>
+            <a:schemeClr val="bg1">
+              <a:lumMod val="75000"/>
+            </a:schemeClr>
+          </a:solidFill>
+          <a:ln w="25400">
+            <a:solidFill>
+              <a:schemeClr val="bg1">
+                <a:lumMod val="75000"/>
+              </a:schemeClr>
+            </a:solidFill>
+          </a:ln>
+          <a:effectLst/>
+        </p:spPr>
+        <p:style>
+          <a:lnRef idx="1">
+            <a:schemeClr val="accent1"/>
+          </a:lnRef>
+          <a:fillRef idx="3">
+            <a:schemeClr val="accent1"/>
+          </a:fillRef>
+          <a:effectRef idx="2">
+            <a:schemeClr val="accent1"/>
+          </a:effectRef>
+          <a:fontRef idx="minor">
+            <a:schemeClr val="lt1"/>
+          </a:fontRef>
+        </p:style>
+        <p:txBody>
+          <a:bodyPr rtlCol="0" anchor="ctr"/>
+          <a:lstStyle/>
+          <a:p>
+            <a:pPr algn="ctr"/>
+            <a:r>
+              <a:rPr lang="ja-JP" altLang="en-US" sz="1400" dirty="0" smtClean="0">
+                <a:solidFill>
+                  <a:schemeClr val="tx1"/>
+                </a:solidFill>
+                <a:latin typeface="メイリオ"/>
+                <a:ea typeface="メイリオ"/>
+                <a:cs typeface="メイリオ"/>
+              </a:rPr>
+              <a:t>日付が不正です</a:t>
+            </a:r>
+            <a:endParaRPr kumimoji="1" lang="ja-JP" altLang="en-US" sz="1400" dirty="0">
+              <a:solidFill>
+                <a:schemeClr val="tx1"/>
+              </a:solidFill>
+              <a:latin typeface="メイリオ"/>
+              <a:ea typeface="メイリオ"/>
+              <a:cs typeface="メイリオ"/>
+            </a:endParaRPr>
+          </a:p>
+        </p:txBody>
+      </p:sp>
+      <p:grpSp>
+        <p:nvGrpSpPr>
+          <p:cNvPr id="32" name="図形グループ 31"/>
+          <p:cNvGrpSpPr/>
+          <p:nvPr/>
+        </p:nvGrpSpPr>
+        <p:grpSpPr>
+          <a:xfrm>
+            <a:off x="702815" y="4405361"/>
+            <a:ext cx="2409517" cy="872852"/>
+            <a:chOff x="5133990" y="4623225"/>
+            <a:chExt cx="2409517" cy="872852"/>
+          </a:xfrm>
+        </p:grpSpPr>
+        <p:sp>
+          <p:nvSpPr>
+            <p:cNvPr id="33" name="円形吹き出し 32"/>
+            <p:cNvSpPr/>
+            <p:nvPr/>
+          </p:nvSpPr>
+          <p:spPr>
+            <a:xfrm>
+              <a:off x="5133990" y="4623225"/>
+              <a:ext cx="2409517" cy="872852"/>
+            </a:xfrm>
+            <a:prstGeom prst="wedgeEllipseCallout">
+              <a:avLst>
+                <a:gd name="adj1" fmla="val 44565"/>
+                <a:gd name="adj2" fmla="val 53709"/>
+              </a:avLst>
+            </a:prstGeom>
+            <a:solidFill>
+              <a:schemeClr val="bg1"/>
+            </a:solidFill>
+            <a:ln w="19050">
+              <a:solidFill>
+                <a:srgbClr val="008000"/>
+              </a:solidFill>
+            </a:ln>
+          </p:spPr>
+          <p:style>
+            <a:lnRef idx="1">
+              <a:schemeClr val="accent1"/>
+            </a:lnRef>
+            <a:fillRef idx="3">
+              <a:schemeClr val="accent1"/>
+            </a:fillRef>
+            <a:effectRef idx="2">
+              <a:schemeClr val="accent1"/>
+            </a:effectRef>
+            <a:fontRef idx="minor">
+              <a:schemeClr val="lt1"/>
+            </a:fontRef>
+          </p:style>
+          <p:txBody>
+            <a:bodyPr rtlCol="0" anchor="ctr"/>
+            <a:lstStyle/>
+            <a:p>
+              <a:pPr algn="ctr"/>
+              <a:endParaRPr kumimoji="1" lang="ja-JP" altLang="en-US" sz="1400" dirty="0">
+                <a:solidFill>
+                  <a:schemeClr val="tx1"/>
+                </a:solidFill>
+                <a:latin typeface="メイリオ"/>
+                <a:ea typeface="メイリオ"/>
+                <a:cs typeface="メイリオ"/>
+              </a:endParaRPr>
+            </a:p>
+          </p:txBody>
+        </p:sp>
+        <p:sp>
+          <p:nvSpPr>
+            <p:cNvPr id="34" name="テキスト ボックス 33"/>
+            <p:cNvSpPr txBox="1"/>
+            <p:nvPr/>
+          </p:nvSpPr>
+          <p:spPr>
+            <a:xfrm>
+              <a:off x="5285980" y="4807152"/>
+              <a:ext cx="1980029" cy="523220"/>
+            </a:xfrm>
+            <a:prstGeom prst="rect">
+              <a:avLst/>
+            </a:prstGeom>
+            <a:noFill/>
+          </p:spPr>
+          <p:txBody>
+            <a:bodyPr wrap="none" rtlCol="0">
+              <a:spAutoFit/>
+            </a:bodyPr>
+            <a:lstStyle/>
+            <a:p>
+              <a:r>
+                <a:rPr lang="ja-JP" altLang="en-US" sz="1400" dirty="0" smtClean="0">
+                  <a:latin typeface="メイリオ"/>
+                  <a:ea typeface="メイリオ"/>
+                  <a:cs typeface="メイリオ"/>
+                </a:rPr>
+                <a:t>入力が不正だった項目</a:t>
+              </a:r>
+              <a:endParaRPr lang="en-US" altLang="ja-JP" sz="1400" dirty="0" smtClean="0">
+                <a:latin typeface="メイリオ"/>
+                <a:ea typeface="メイリオ"/>
+                <a:cs typeface="メイリオ"/>
+              </a:endParaRPr>
+            </a:p>
+            <a:p>
+              <a:r>
+                <a:rPr lang="ja-JP" altLang="en-US" sz="1400" dirty="0" smtClean="0">
+                  <a:latin typeface="メイリオ"/>
+                  <a:ea typeface="メイリオ"/>
+                  <a:cs typeface="メイリオ"/>
+                </a:rPr>
+                <a:t>が表示される</a:t>
+              </a:r>
+              <a:endParaRPr lang="en-US" altLang="ja-JP" sz="1400" dirty="0" smtClean="0">
                 <a:latin typeface="メイリオ"/>
                 <a:ea typeface="メイリオ"/>
                 <a:cs typeface="メイリオ"/>

</xml_diff>